<commit_message>
Updated PPT Final presentation
</commit_message>
<xml_diff>
--- a/Documentation/NDRRMC Monitoring System2Finals.pptx
+++ b/Documentation/NDRRMC Monitoring System2Finals.pptx
@@ -6,16 +6,16 @@
   </p:sldMasterIdLst>
   <p:sldIdLst>
     <p:sldId id="256" r:id="rId2"/>
-    <p:sldId id="257" r:id="rId3"/>
-    <p:sldId id="258" r:id="rId4"/>
+    <p:sldId id="290" r:id="rId3"/>
+    <p:sldId id="257" r:id="rId4"/>
     <p:sldId id="259" r:id="rId5"/>
-    <p:sldId id="274" r:id="rId6"/>
-    <p:sldId id="260" r:id="rId7"/>
-    <p:sldId id="261" r:id="rId8"/>
-    <p:sldId id="262" r:id="rId9"/>
+    <p:sldId id="258" r:id="rId6"/>
+    <p:sldId id="274" r:id="rId7"/>
+    <p:sldId id="260" r:id="rId8"/>
+    <p:sldId id="261" r:id="rId9"/>
     <p:sldId id="263" r:id="rId10"/>
     <p:sldId id="264" r:id="rId11"/>
-    <p:sldId id="265" r:id="rId12"/>
+    <p:sldId id="292" r:id="rId12"/>
     <p:sldId id="266" r:id="rId13"/>
     <p:sldId id="267" r:id="rId14"/>
     <p:sldId id="268" r:id="rId15"/>
@@ -24,15 +24,21 @@
     <p:sldId id="271" r:id="rId18"/>
     <p:sldId id="272" r:id="rId19"/>
     <p:sldId id="273" r:id="rId20"/>
-    <p:sldId id="275" r:id="rId21"/>
-    <p:sldId id="276" r:id="rId22"/>
-    <p:sldId id="277" r:id="rId23"/>
-    <p:sldId id="279" r:id="rId24"/>
-    <p:sldId id="278" r:id="rId25"/>
-    <p:sldId id="280" r:id="rId26"/>
-    <p:sldId id="281" r:id="rId27"/>
-    <p:sldId id="282" r:id="rId28"/>
-    <p:sldId id="283" r:id="rId29"/>
+    <p:sldId id="286" r:id="rId21"/>
+    <p:sldId id="288" r:id="rId22"/>
+    <p:sldId id="275" r:id="rId23"/>
+    <p:sldId id="276" r:id="rId24"/>
+    <p:sldId id="277" r:id="rId25"/>
+    <p:sldId id="289" r:id="rId26"/>
+    <p:sldId id="284" r:id="rId27"/>
+    <p:sldId id="279" r:id="rId28"/>
+    <p:sldId id="278" r:id="rId29"/>
+    <p:sldId id="280" r:id="rId30"/>
+    <p:sldId id="281" r:id="rId31"/>
+    <p:sldId id="282" r:id="rId32"/>
+    <p:sldId id="283" r:id="rId33"/>
+    <p:sldId id="287" r:id="rId34"/>
+    <p:sldId id="291" r:id="rId35"/>
   </p:sldIdLst>
   <p:sldSz cx="12192000" cy="6858000"/>
   <p:notesSz cx="7559675" cy="10691813"/>
@@ -2984,7 +2990,7 @@
         </p:blipFill>
         <p:spPr>
           <a:xfrm>
-            <a:off x="2231640" y="1957320"/>
+            <a:off x="2231640" y="1969195"/>
             <a:ext cx="7789320" cy="3904920"/>
           </a:xfrm>
           <a:prstGeom prst="rect">
@@ -3057,7 +3063,7 @@
       </p:grpSpPr>
       <p:sp>
         <p:nvSpPr>
-          <p:cNvPr id="105" name="TextShape 1"/>
+          <p:cNvPr id="103" name="TextShape 1"/>
           <p:cNvSpPr txBox="1"/>
           <p:nvPr/>
         </p:nvSpPr>
@@ -3084,7 +3090,7 @@
               </a:lnSpc>
             </a:pPr>
             <a:r>
-              <a:rPr lang="en-US" sz="4800" b="0" strike="noStrike" spc="-49">
+              <a:rPr lang="en-US" sz="4800" b="0" strike="noStrike" spc="-49" dirty="0">
                 <a:solidFill>
                   <a:srgbClr val="404040"/>
                 </a:solidFill>
@@ -3095,9 +3101,9 @@
                 </a:uFill>
                 <a:latin typeface="Calibri Light"/>
               </a:rPr>
-              <a:t>Features and Functions</a:t>
+              <a:t>Technical Background</a:t>
             </a:r>
-            <a:endParaRPr lang="en-US" sz="1800" b="0" strike="noStrike" spc="-1">
+            <a:endParaRPr lang="en-US" sz="1800" b="0" strike="noStrike" spc="-1" dirty="0">
               <a:solidFill>
                 <a:srgbClr val="000000"/>
               </a:solidFill>
@@ -3113,7 +3119,7 @@
       </p:sp>
       <p:sp>
         <p:nvSpPr>
-          <p:cNvPr id="106" name="TextShape 2"/>
+          <p:cNvPr id="4" name="TextShape 2"/>
           <p:cNvSpPr txBox="1"/>
           <p:nvPr/>
         </p:nvSpPr>
@@ -3134,7 +3140,31 @@
           <a:bodyPr lIns="0" rIns="0"/>
           <a:lstStyle/>
           <a:p>
-            <a:endParaRPr lang="en-US" sz="2000" b="0" strike="noStrike" spc="-1">
+            <a:pPr marL="384120" lvl="1" indent="-182520">
+              <a:lnSpc>
+                <a:spcPct val="100000"/>
+              </a:lnSpc>
+              <a:buClr>
+                <a:srgbClr val="9DBFBE"/>
+              </a:buClr>
+              <a:buFont typeface="Calibri"/>
+              <a:buChar char="◦"/>
+            </a:pPr>
+            <a:r>
+              <a:rPr lang="en-US" sz="2400" spc="-1" dirty="0">
+                <a:solidFill>
+                  <a:srgbClr val="404040"/>
+                </a:solidFill>
+                <a:uFill>
+                  <a:solidFill>
+                    <a:srgbClr val="FFFFFF"/>
+                  </a:solidFill>
+                </a:uFill>
+                <a:latin typeface="Calibri"/>
+              </a:rPr>
+              <a:t>Ubuntu</a:t>
+            </a:r>
+            <a:endParaRPr lang="en-US" sz="1400" spc="-1" dirty="0">
               <a:solidFill>
                 <a:srgbClr val="404040"/>
               </a:solidFill>
@@ -3146,9 +3176,149 @@
               <a:latin typeface="Calibri"/>
             </a:endParaRPr>
           </a:p>
+          <a:p>
+            <a:endParaRPr lang="en-US" sz="2000" spc="-1" dirty="0">
+              <a:solidFill>
+                <a:srgbClr val="404040"/>
+              </a:solidFill>
+              <a:uFill>
+                <a:solidFill>
+                  <a:srgbClr val="FFFFFF"/>
+                </a:solidFill>
+              </a:uFill>
+              <a:latin typeface="Calibri"/>
+            </a:endParaRPr>
+          </a:p>
+          <a:p>
+            <a:pPr marL="384120" lvl="1" indent="-182520">
+              <a:lnSpc>
+                <a:spcPct val="100000"/>
+              </a:lnSpc>
+              <a:buClr>
+                <a:srgbClr val="9DBFBE"/>
+              </a:buClr>
+              <a:buFont typeface="Calibri"/>
+              <a:buChar char="◦"/>
+            </a:pPr>
+            <a:r>
+              <a:rPr lang="en-US" sz="2400" spc="-1" dirty="0">
+                <a:solidFill>
+                  <a:srgbClr val="404040"/>
+                </a:solidFill>
+                <a:uFill>
+                  <a:solidFill>
+                    <a:srgbClr val="FFFFFF"/>
+                  </a:solidFill>
+                </a:uFill>
+                <a:latin typeface="Calibri"/>
+              </a:rPr>
+              <a:t>MySQL Server &amp; Cassandra Server</a:t>
+            </a:r>
+            <a:endParaRPr lang="en-US" sz="1400" spc="-1" dirty="0">
+              <a:solidFill>
+                <a:srgbClr val="404040"/>
+              </a:solidFill>
+              <a:uFill>
+                <a:solidFill>
+                  <a:srgbClr val="FFFFFF"/>
+                </a:solidFill>
+              </a:uFill>
+              <a:latin typeface="Calibri"/>
+            </a:endParaRPr>
+          </a:p>
+          <a:p>
+            <a:endParaRPr lang="en-US" sz="2000" spc="-1" dirty="0">
+              <a:solidFill>
+                <a:srgbClr val="404040"/>
+              </a:solidFill>
+              <a:uFill>
+                <a:solidFill>
+                  <a:srgbClr val="FFFFFF"/>
+                </a:solidFill>
+              </a:uFill>
+              <a:latin typeface="Calibri"/>
+            </a:endParaRPr>
+          </a:p>
+          <a:p>
+            <a:pPr marL="384120" lvl="1" indent="-182520">
+              <a:lnSpc>
+                <a:spcPct val="100000"/>
+              </a:lnSpc>
+              <a:buClr>
+                <a:srgbClr val="9DBFBE"/>
+              </a:buClr>
+              <a:buFont typeface="Calibri"/>
+              <a:buChar char="◦"/>
+            </a:pPr>
+            <a:r>
+              <a:rPr lang="en-US" sz="2400" spc="-1" dirty="0">
+                <a:solidFill>
+                  <a:srgbClr val="404040"/>
+                </a:solidFill>
+                <a:uFill>
+                  <a:solidFill>
+                    <a:srgbClr val="FFFFFF"/>
+                  </a:solidFill>
+                </a:uFill>
+                <a:latin typeface="Calibri"/>
+              </a:rPr>
+              <a:t>Cloud9Agent Server</a:t>
+            </a:r>
+          </a:p>
+          <a:p>
+            <a:pPr marL="384120" lvl="1" indent="-182520">
+              <a:lnSpc>
+                <a:spcPct val="100000"/>
+              </a:lnSpc>
+              <a:buClr>
+                <a:srgbClr val="9DBFBE"/>
+              </a:buClr>
+              <a:buFont typeface="Calibri"/>
+              <a:buChar char="◦"/>
+            </a:pPr>
+            <a:endParaRPr lang="en-US" sz="2400" spc="-1" dirty="0">
+              <a:solidFill>
+                <a:srgbClr val="404040"/>
+              </a:solidFill>
+              <a:uFill>
+                <a:solidFill>
+                  <a:srgbClr val="FFFFFF"/>
+                </a:solidFill>
+              </a:uFill>
+              <a:latin typeface="Calibri"/>
+            </a:endParaRPr>
+          </a:p>
+          <a:p>
+            <a:pPr marL="384120" lvl="1" indent="-182520">
+              <a:lnSpc>
+                <a:spcPct val="100000"/>
+              </a:lnSpc>
+              <a:buClr>
+                <a:srgbClr val="9DBFBE"/>
+              </a:buClr>
+              <a:buFont typeface="Calibri"/>
+              <a:buChar char="◦"/>
+            </a:pPr>
+            <a:endParaRPr lang="en-US" sz="2400" spc="-1" dirty="0">
+              <a:solidFill>
+                <a:srgbClr val="404040"/>
+              </a:solidFill>
+              <a:uFill>
+                <a:solidFill>
+                  <a:srgbClr val="FFFFFF"/>
+                </a:solidFill>
+              </a:uFill>
+              <a:latin typeface="Calibri"/>
+            </a:endParaRPr>
+          </a:p>
         </p:txBody>
       </p:sp>
     </p:spTree>
+    <p:extLst>
+      <p:ext uri="{BB962C8B-B14F-4D97-AF65-F5344CB8AC3E}">
+        <p14:creationId xmlns:p14="http://schemas.microsoft.com/office/powerpoint/2010/main" val="1049959683"/>
+      </p:ext>
+    </p:extLst>
   </p:cSld>
   <p:clrMapOvr>
     <a:masterClrMapping/>
@@ -4194,16 +4364,46 @@
           <a:chExt cx="0" cy="0"/>
         </a:xfrm>
       </p:grpSpPr>
-      <p:sp>
-        <p:nvSpPr>
-          <p:cNvPr id="89" name="TextShape 1"/>
+      <p:pic>
+        <p:nvPicPr>
+          <p:cNvPr id="2" name="Picture 1"/>
+          <p:cNvPicPr>
+            <a:picLocks noChangeAspect="1"/>
+          </p:cNvPicPr>
+          <p:nvPr/>
+        </p:nvPicPr>
+        <p:blipFill>
+          <a:blip r:embed="rId2">
+            <a:extLst>
+              <a:ext uri="{28A0092B-C50C-407E-A947-70E740481C1C}">
+                <a14:useLocalDpi xmlns:a14="http://schemas.microsoft.com/office/drawing/2010/main" val="0"/>
+              </a:ext>
+            </a:extLst>
+          </a:blip>
+          <a:stretch>
+            <a:fillRect/>
+          </a:stretch>
+        </p:blipFill>
+        <p:spPr>
+          <a:xfrm>
+            <a:off x="5795158" y="1959428"/>
+            <a:ext cx="5058890" cy="2897579"/>
+          </a:xfrm>
+          <a:prstGeom prst="rect">
+            <a:avLst/>
+          </a:prstGeom>
+        </p:spPr>
+      </p:pic>
+      <p:sp>
+        <p:nvSpPr>
+          <p:cNvPr id="5" name="TextShape 1"/>
           <p:cNvSpPr txBox="1"/>
           <p:nvPr/>
         </p:nvSpPr>
         <p:spPr>
           <a:xfrm>
-            <a:off x="1097280" y="286560"/>
-            <a:ext cx="10058040" cy="1450440"/>
+            <a:off x="5581403" y="4752106"/>
+            <a:ext cx="5272645" cy="1095733"/>
           </a:xfrm>
           <a:prstGeom prst="rect">
             <a:avLst/>
@@ -4217,13 +4417,13 @@
           <a:bodyPr anchor="b"/>
           <a:lstStyle/>
           <a:p>
-            <a:pPr>
+            <a:pPr algn="ctr">
               <a:lnSpc>
                 <a:spcPct val="85000"/>
               </a:lnSpc>
             </a:pPr>
             <a:r>
-              <a:rPr lang="en-US" sz="4800" b="1" strike="noStrike" spc="-49">
+              <a:rPr lang="en-US" sz="4800" b="1" strike="noStrike" spc="-49" dirty="0">
                 <a:solidFill>
                   <a:srgbClr val="404040"/>
                 </a:solidFill>
@@ -4234,9 +4434,9 @@
                 </a:uFill>
                 <a:latin typeface="Calibri Light"/>
               </a:rPr>
-              <a:t>Problem</a:t>
+              <a:t>Lead Agency</a:t>
             </a:r>
-            <a:endParaRPr lang="en-US" sz="1800" b="0" strike="noStrike" spc="-1">
+            <a:endParaRPr lang="en-US" sz="1800" b="0" strike="noStrike" spc="-1" dirty="0">
               <a:solidFill>
                 <a:srgbClr val="000000"/>
               </a:solidFill>
@@ -4250,16 +4450,46 @@
           </a:p>
         </p:txBody>
       </p:sp>
-      <p:sp>
-        <p:nvSpPr>
-          <p:cNvPr id="90" name="TextShape 2"/>
+      <p:pic>
+        <p:nvPicPr>
+          <p:cNvPr id="3" name="Picture 2"/>
+          <p:cNvPicPr>
+            <a:picLocks noChangeAspect="1"/>
+          </p:cNvPicPr>
+          <p:nvPr/>
+        </p:nvPicPr>
+        <p:blipFill>
+          <a:blip r:embed="rId3">
+            <a:extLst>
+              <a:ext uri="{28A0092B-C50C-407E-A947-70E740481C1C}">
+                <a14:useLocalDpi xmlns:a14="http://schemas.microsoft.com/office/drawing/2010/main" val="0"/>
+              </a:ext>
+            </a:extLst>
+          </a:blip>
+          <a:stretch>
+            <a:fillRect/>
+          </a:stretch>
+        </p:blipFill>
+        <p:spPr>
+          <a:xfrm>
+            <a:off x="954086" y="2125683"/>
+            <a:ext cx="4627315" cy="2614550"/>
+          </a:xfrm>
+          <a:prstGeom prst="rect">
+            <a:avLst/>
+          </a:prstGeom>
+        </p:spPr>
+      </p:pic>
+      <p:sp>
+        <p:nvSpPr>
+          <p:cNvPr id="7" name="TextShape 1"/>
           <p:cNvSpPr txBox="1"/>
           <p:nvPr/>
         </p:nvSpPr>
         <p:spPr>
           <a:xfrm>
-            <a:off x="1097280" y="1845720"/>
-            <a:ext cx="10058040" cy="4023000"/>
+            <a:off x="631420" y="4857005"/>
+            <a:ext cx="5272645" cy="978961"/>
           </a:xfrm>
           <a:prstGeom prst="rect">
             <a:avLst/>
@@ -4270,21 +4500,16 @@
           </a:ln>
         </p:spPr>
         <p:txBody>
-          <a:bodyPr lIns="0" rIns="0"/>
-          <a:lstStyle/>
-          <a:p>
-            <a:pPr marL="384120" lvl="1" indent="-182520">
+          <a:bodyPr anchor="b"/>
+          <a:lstStyle/>
+          <a:p>
+            <a:pPr algn="ctr">
               <a:lnSpc>
-                <a:spcPct val="100000"/>
+                <a:spcPct val="85000"/>
               </a:lnSpc>
-              <a:buClr>
-                <a:srgbClr val="9DBFBE"/>
-              </a:buClr>
-              <a:buFont typeface="Arial"/>
-              <a:buChar char="•"/>
             </a:pPr>
             <a:r>
-              <a:rPr lang="en-US" sz="2400" b="0" strike="noStrike" spc="-1">
+              <a:rPr lang="en-US" sz="4800" b="1" strike="noStrike" spc="-49" dirty="0">
                 <a:solidFill>
                   <a:srgbClr val="404040"/>
                 </a:solidFill>
@@ -4293,181 +4518,13 @@
                     <a:srgbClr val="FFFFFF"/>
                   </a:solidFill>
                 </a:uFill>
-                <a:latin typeface="Calibri"/>
+                <a:latin typeface="Calibri Light"/>
               </a:rPr>
-              <a:t>Lack of capacity and technical expertise</a:t>
+              <a:t>Client</a:t>
             </a:r>
-            <a:endParaRPr lang="en-US" sz="1400" b="0" strike="noStrike" spc="-1">
-              <a:solidFill>
-                <a:srgbClr val="404040"/>
-              </a:solidFill>
-              <a:uFill>
-                <a:solidFill>
-                  <a:srgbClr val="FFFFFF"/>
-                </a:solidFill>
-              </a:uFill>
-              <a:latin typeface="Calibri"/>
-            </a:endParaRPr>
-          </a:p>
-          <a:p>
-            <a:endParaRPr lang="en-US" sz="2000" b="0" strike="noStrike" spc="-1">
-              <a:solidFill>
-                <a:srgbClr val="404040"/>
-              </a:solidFill>
-              <a:uFill>
-                <a:solidFill>
-                  <a:srgbClr val="FFFFFF"/>
-                </a:solidFill>
-              </a:uFill>
-              <a:latin typeface="Calibri"/>
-            </a:endParaRPr>
-          </a:p>
-          <a:p>
-            <a:pPr marL="384120" lvl="1" indent="-182520">
-              <a:lnSpc>
-                <a:spcPct val="100000"/>
-              </a:lnSpc>
-              <a:buClr>
-                <a:srgbClr val="9DBFBE"/>
-              </a:buClr>
-              <a:buFont typeface="Arial"/>
-              <a:buChar char="•"/>
-            </a:pPr>
-            <a:r>
-              <a:rPr lang="en-US" sz="2400" b="0" strike="noStrike" spc="-1">
-                <a:solidFill>
-                  <a:srgbClr val="404040"/>
-                </a:solidFill>
-                <a:uFill>
-                  <a:solidFill>
-                    <a:srgbClr val="FFFFFF"/>
-                  </a:solidFill>
-                </a:uFill>
-                <a:latin typeface="Calibri"/>
-              </a:rPr>
-              <a:t>Lack of public awareness or the threats and impacts of all types of hazards</a:t>
-            </a:r>
-            <a:endParaRPr lang="en-US" sz="1400" b="0" strike="noStrike" spc="-1">
-              <a:solidFill>
-                <a:srgbClr val="404040"/>
-              </a:solidFill>
-              <a:uFill>
-                <a:solidFill>
-                  <a:srgbClr val="FFFFFF"/>
-                </a:solidFill>
-              </a:uFill>
-              <a:latin typeface="Calibri"/>
-            </a:endParaRPr>
-          </a:p>
-          <a:p>
-            <a:endParaRPr lang="en-US" sz="2000" b="0" strike="noStrike" spc="-1">
-              <a:solidFill>
-                <a:srgbClr val="404040"/>
-              </a:solidFill>
-              <a:uFill>
-                <a:solidFill>
-                  <a:srgbClr val="FFFFFF"/>
-                </a:solidFill>
-              </a:uFill>
-              <a:latin typeface="Calibri"/>
-            </a:endParaRPr>
-          </a:p>
-          <a:p>
-            <a:pPr marL="384120" lvl="1" indent="-182520">
-              <a:lnSpc>
-                <a:spcPct val="100000"/>
-              </a:lnSpc>
-              <a:buClr>
-                <a:srgbClr val="9DBFBE"/>
-              </a:buClr>
-              <a:buFont typeface="Arial"/>
-              <a:buChar char="•"/>
-            </a:pPr>
-            <a:r>
-              <a:rPr lang="en-US" sz="2400" b="0" strike="noStrike" spc="-1">
-                <a:solidFill>
-                  <a:srgbClr val="404040"/>
-                </a:solidFill>
-                <a:uFill>
-                  <a:solidFill>
-                    <a:srgbClr val="FFFFFF"/>
-                  </a:solidFill>
-                </a:uFill>
-                <a:latin typeface="Calibri"/>
-              </a:rPr>
-              <a:t>Lack of necessary skills to cope with the impacts of disaster</a:t>
-            </a:r>
-            <a:endParaRPr lang="en-US" sz="1400" b="0" strike="noStrike" spc="-1">
-              <a:solidFill>
-                <a:srgbClr val="404040"/>
-              </a:solidFill>
-              <a:uFill>
-                <a:solidFill>
-                  <a:srgbClr val="FFFFFF"/>
-                </a:solidFill>
-              </a:uFill>
-              <a:latin typeface="Calibri"/>
-            </a:endParaRPr>
-          </a:p>
-          <a:p>
-            <a:endParaRPr lang="en-US" sz="2000" b="0" strike="noStrike" spc="-1">
-              <a:solidFill>
-                <a:srgbClr val="404040"/>
-              </a:solidFill>
-              <a:uFill>
-                <a:solidFill>
-                  <a:srgbClr val="FFFFFF"/>
-                </a:solidFill>
-              </a:uFill>
-              <a:latin typeface="Calibri"/>
-            </a:endParaRPr>
-          </a:p>
-          <a:p>
-            <a:pPr marL="384120" lvl="1" indent="-182520">
-              <a:lnSpc>
-                <a:spcPct val="100000"/>
-              </a:lnSpc>
-              <a:buClr>
-                <a:srgbClr val="9DBFBE"/>
-              </a:buClr>
-              <a:buFont typeface="Arial"/>
-              <a:buChar char="•"/>
-            </a:pPr>
-            <a:r>
-              <a:rPr lang="en-US" sz="2400" b="0" strike="noStrike" spc="-1">
-                <a:solidFill>
-                  <a:srgbClr val="404040"/>
-                </a:solidFill>
-                <a:uFill>
-                  <a:solidFill>
-                    <a:srgbClr val="FFFFFF"/>
-                  </a:solidFill>
-                </a:uFill>
-                <a:latin typeface="Calibri"/>
-              </a:rPr>
-              <a:t>Lack of communication and coordination</a:t>
-            </a:r>
-            <a:endParaRPr lang="en-US" sz="1400" b="0" strike="noStrike" spc="-1">
-              <a:solidFill>
-                <a:srgbClr val="404040"/>
-              </a:solidFill>
-              <a:uFill>
-                <a:solidFill>
-                  <a:srgbClr val="FFFFFF"/>
-                </a:solidFill>
-              </a:uFill>
-              <a:latin typeface="Calibri"/>
-            </a:endParaRPr>
-          </a:p>
-          <a:p>
-            <a:pPr>
-              <a:lnSpc>
-                <a:spcPct val="90000"/>
-              </a:lnSpc>
-            </a:pPr>
-            <a:endParaRPr lang="en-US" sz="2000" b="0" strike="noStrike" spc="-1">
-              <a:solidFill>
-                <a:srgbClr val="404040"/>
+            <a:endParaRPr lang="en-US" sz="1800" b="0" strike="noStrike" spc="-1" dirty="0">
+              <a:solidFill>
+                <a:srgbClr val="000000"/>
               </a:solidFill>
               <a:uFill>
                 <a:solidFill>
@@ -4480,6 +4537,11 @@
         </p:txBody>
       </p:sp>
     </p:spTree>
+    <p:extLst>
+      <p:ext uri="{BB962C8B-B14F-4D97-AF65-F5344CB8AC3E}">
+        <p14:creationId xmlns:p14="http://schemas.microsoft.com/office/powerpoint/2010/main" val="2918446197"/>
+      </p:ext>
+    </p:extLst>
   </p:cSld>
   <p:clrMapOvr>
     <a:masterClrMapping/>
@@ -4517,6 +4579,14 @@
 <file path=ppt/slides/slide20.xml><?xml version="1.0" encoding="utf-8"?>
 <p:sld xmlns:a="http://schemas.openxmlformats.org/drawingml/2006/main" xmlns:r="http://schemas.openxmlformats.org/officeDocument/2006/relationships" xmlns:p="http://schemas.openxmlformats.org/presentationml/2006/main">
   <p:cSld>
+    <p:bg>
+      <p:bgPr>
+        <a:solidFill>
+          <a:srgbClr val="FFFFFF"/>
+        </a:solidFill>
+        <a:effectLst/>
+      </p:bgPr>
+    </p:bg>
     <p:spTree>
       <p:nvGrpSpPr>
         <p:cNvPr id="1" name=""/>
@@ -4533,82 +4603,112 @@
       </p:grpSpPr>
       <p:sp>
         <p:nvSpPr>
-          <p:cNvPr id="2" name="Title 1"/>
-          <p:cNvSpPr>
-            <a:spLocks noGrp="1"/>
-          </p:cNvSpPr>
-          <p:nvPr>
-            <p:ph type="title"/>
-          </p:nvPr>
-        </p:nvSpPr>
-        <p:spPr/>
-        <p:txBody>
-          <a:bodyPr/>
-          <a:lstStyle/>
-          <a:p>
-            <a:endParaRPr lang="en-US"/>
-          </a:p>
-        </p:txBody>
-      </p:sp>
-      <p:sp>
-        <p:nvSpPr>
-          <p:cNvPr id="3" name="Subtitle 2"/>
-          <p:cNvSpPr>
-            <a:spLocks noGrp="1"/>
-          </p:cNvSpPr>
-          <p:nvPr>
-            <p:ph type="subTitle"/>
-          </p:nvPr>
-        </p:nvSpPr>
-        <p:spPr/>
-        <p:txBody>
-          <a:bodyPr/>
-          <a:lstStyle/>
-          <a:p>
-            <a:endParaRPr lang="en-US"/>
-          </a:p>
-        </p:txBody>
-      </p:sp>
-      <p:pic>
-        <p:nvPicPr>
-          <p:cNvPr id="4" name="Picture 3"/>
-          <p:cNvPicPr>
-            <a:picLocks noChangeAspect="1"/>
-          </p:cNvPicPr>
+          <p:cNvPr id="87" name="TextShape 1"/>
+          <p:cNvSpPr txBox="1"/>
           <p:nvPr/>
-        </p:nvPicPr>
-        <p:blipFill>
-          <a:blip r:embed="rId2"/>
-          <a:stretch>
-            <a:fillRect/>
-          </a:stretch>
-        </p:blipFill>
-        <p:spPr>
-          <a:xfrm>
-            <a:off x="0" y="1674"/>
-            <a:ext cx="12192000" cy="6351626"/>
-          </a:xfrm>
-          <a:prstGeom prst="rect">
-            <a:avLst/>
-          </a:prstGeom>
-        </p:spPr>
-      </p:pic>
+        </p:nvSpPr>
+        <p:spPr>
+          <a:xfrm>
+            <a:off x="1097280" y="758880"/>
+            <a:ext cx="10058040" cy="3565800"/>
+          </a:xfrm>
+          <a:prstGeom prst="rect">
+            <a:avLst/>
+          </a:prstGeom>
+          <a:noFill/>
+          <a:ln>
+            <a:noFill/>
+          </a:ln>
+        </p:spPr>
+        <p:txBody>
+          <a:bodyPr anchor="b"/>
+          <a:lstStyle/>
+          <a:p>
+            <a:pPr>
+              <a:lnSpc>
+                <a:spcPct val="85000"/>
+              </a:lnSpc>
+            </a:pPr>
+            <a:r>
+              <a:rPr lang="en-US" sz="6500" b="1" strike="noStrike" spc="-49" dirty="0">
+                <a:solidFill>
+                  <a:srgbClr val="262626"/>
+                </a:solidFill>
+                <a:uFill>
+                  <a:solidFill>
+                    <a:srgbClr val="FFFFFF"/>
+                  </a:solidFill>
+                </a:uFill>
+                <a:latin typeface="Calibri Light"/>
+              </a:rPr>
+              <a:t>PROTOTYPE
+</a:t>
+            </a:r>
+            <a:endParaRPr lang="en-US" sz="1800" b="0" strike="noStrike" spc="-1" dirty="0">
+              <a:solidFill>
+                <a:srgbClr val="000000"/>
+              </a:solidFill>
+              <a:uFill>
+                <a:solidFill>
+                  <a:srgbClr val="FFFFFF"/>
+                </a:solidFill>
+              </a:uFill>
+              <a:latin typeface="Calibri"/>
+            </a:endParaRPr>
+          </a:p>
+        </p:txBody>
+      </p:sp>
     </p:spTree>
     <p:extLst>
       <p:ext uri="{BB962C8B-B14F-4D97-AF65-F5344CB8AC3E}">
-        <p14:creationId xmlns:p14="http://schemas.microsoft.com/office/powerpoint/2010/main" val="3723748021"/>
+        <p14:creationId xmlns:p14="http://schemas.microsoft.com/office/powerpoint/2010/main" val="75477934"/>
       </p:ext>
     </p:extLst>
   </p:cSld>
   <p:clrMapOvr>
     <a:masterClrMapping/>
   </p:clrMapOvr>
+  <p:timing>
+    <p:tnLst>
+      <p:par>
+        <p:cTn id="1" dur="indefinite" restart="never" nodeType="tmRoot">
+          <p:childTnLst>
+            <p:seq>
+              <p:cTn id="2" nodeType="mainSeq"/>
+              <p:prevCondLst>
+                <p:cond evt="onPrev" delay="0">
+                  <p:tgtEl>
+                    <p:sldTgt/>
+                  </p:tgtEl>
+                </p:cond>
+              </p:prevCondLst>
+              <p:nextCondLst>
+                <p:cond evt="onNext" delay="0">
+                  <p:tgtEl>
+                    <p:sldTgt/>
+                  </p:tgtEl>
+                </p:cond>
+              </p:nextCondLst>
+            </p:seq>
+          </p:childTnLst>
+        </p:cTn>
+      </p:par>
+    </p:tnLst>
+  </p:timing>
 </p:sld>
 </file>
 
 <file path=ppt/slides/slide21.xml><?xml version="1.0" encoding="utf-8"?>
 <p:sld xmlns:a="http://schemas.openxmlformats.org/drawingml/2006/main" xmlns:r="http://schemas.openxmlformats.org/officeDocument/2006/relationships" xmlns:p="http://schemas.openxmlformats.org/presentationml/2006/main">
   <p:cSld>
+    <p:bg>
+      <p:bgPr>
+        <a:solidFill>
+          <a:srgbClr val="FFFFFF"/>
+        </a:solidFill>
+        <a:effectLst/>
+      </p:bgPr>
+    </p:bg>
     <p:spTree>
       <p:nvGrpSpPr>
         <p:cNvPr id="1" name=""/>
@@ -4623,47 +4723,9 @@
           <a:chExt cx="0" cy="0"/>
         </a:xfrm>
       </p:grpSpPr>
-      <p:sp>
-        <p:nvSpPr>
-          <p:cNvPr id="2" name="Title 1"/>
-          <p:cNvSpPr>
-            <a:spLocks noGrp="1"/>
-          </p:cNvSpPr>
-          <p:nvPr>
-            <p:ph type="title"/>
-          </p:nvPr>
-        </p:nvSpPr>
-        <p:spPr/>
-        <p:txBody>
-          <a:bodyPr/>
-          <a:lstStyle/>
-          <a:p>
-            <a:endParaRPr lang="en-US"/>
-          </a:p>
-        </p:txBody>
-      </p:sp>
-      <p:sp>
-        <p:nvSpPr>
-          <p:cNvPr id="3" name="Subtitle 2"/>
-          <p:cNvSpPr>
-            <a:spLocks noGrp="1"/>
-          </p:cNvSpPr>
-          <p:nvPr>
-            <p:ph type="subTitle"/>
-          </p:nvPr>
-        </p:nvSpPr>
-        <p:spPr/>
-        <p:txBody>
-          <a:bodyPr/>
-          <a:lstStyle/>
-          <a:p>
-            <a:endParaRPr lang="en-US"/>
-          </a:p>
-        </p:txBody>
-      </p:sp>
       <p:pic>
         <p:nvPicPr>
-          <p:cNvPr id="4" name="Picture 3"/>
+          <p:cNvPr id="2" name="Picture 1"/>
           <p:cNvPicPr>
             <a:picLocks noChangeAspect="1"/>
           </p:cNvPicPr>
@@ -4677,8 +4739,8 @@
         </p:blipFill>
         <p:spPr>
           <a:xfrm>
-            <a:off x="0" y="1673"/>
-            <a:ext cx="12192000" cy="6327875"/>
+            <a:off x="0" y="1"/>
+            <a:ext cx="12192000" cy="6400800"/>
           </a:xfrm>
           <a:prstGeom prst="rect">
             <a:avLst/>
@@ -4688,13 +4750,40 @@
     </p:spTree>
     <p:extLst>
       <p:ext uri="{BB962C8B-B14F-4D97-AF65-F5344CB8AC3E}">
-        <p14:creationId xmlns:p14="http://schemas.microsoft.com/office/powerpoint/2010/main" val="2932817652"/>
+        <p14:creationId xmlns:p14="http://schemas.microsoft.com/office/powerpoint/2010/main" val="665875413"/>
       </p:ext>
     </p:extLst>
   </p:cSld>
   <p:clrMapOvr>
     <a:masterClrMapping/>
   </p:clrMapOvr>
+  <p:timing>
+    <p:tnLst>
+      <p:par>
+        <p:cTn id="1" dur="indefinite" restart="never" nodeType="tmRoot">
+          <p:childTnLst>
+            <p:seq>
+              <p:cTn id="2" nodeType="mainSeq"/>
+              <p:prevCondLst>
+                <p:cond evt="onPrev" delay="0">
+                  <p:tgtEl>
+                    <p:sldTgt/>
+                  </p:tgtEl>
+                </p:cond>
+              </p:prevCondLst>
+              <p:nextCondLst>
+                <p:cond evt="onNext" delay="0">
+                  <p:tgtEl>
+                    <p:sldTgt/>
+                  </p:tgtEl>
+                </p:cond>
+              </p:nextCondLst>
+            </p:seq>
+          </p:childTnLst>
+        </p:cTn>
+      </p:par>
+    </p:tnLst>
+  </p:timing>
 </p:sld>
 </file>
 
@@ -4769,8 +4858,8 @@
         </p:blipFill>
         <p:spPr>
           <a:xfrm>
-            <a:off x="0" y="1673"/>
-            <a:ext cx="12192000" cy="6327875"/>
+            <a:off x="0" y="-35626"/>
+            <a:ext cx="12192000" cy="6353300"/>
           </a:xfrm>
           <a:prstGeom prst="rect">
             <a:avLst/>
@@ -4780,7 +4869,7 @@
     </p:spTree>
     <p:extLst>
       <p:ext uri="{BB962C8B-B14F-4D97-AF65-F5344CB8AC3E}">
-        <p14:creationId xmlns:p14="http://schemas.microsoft.com/office/powerpoint/2010/main" val="1668086761"/>
+        <p14:creationId xmlns:p14="http://schemas.microsoft.com/office/powerpoint/2010/main" val="3723748021"/>
       </p:ext>
     </p:extLst>
   </p:cSld>
@@ -4861,8 +4950,8 @@
         </p:blipFill>
         <p:spPr>
           <a:xfrm>
-            <a:off x="0" y="1674"/>
-            <a:ext cx="12192000" cy="6351626"/>
+            <a:off x="0" y="1673"/>
+            <a:ext cx="12192000" cy="6327875"/>
           </a:xfrm>
           <a:prstGeom prst="rect">
             <a:avLst/>
@@ -4872,7 +4961,7 @@
     </p:spTree>
     <p:extLst>
       <p:ext uri="{BB962C8B-B14F-4D97-AF65-F5344CB8AC3E}">
-        <p14:creationId xmlns:p14="http://schemas.microsoft.com/office/powerpoint/2010/main" val="2999014714"/>
+        <p14:creationId xmlns:p14="http://schemas.microsoft.com/office/powerpoint/2010/main" val="2932817652"/>
       </p:ext>
     </p:extLst>
   </p:cSld>
@@ -4964,7 +5053,7 @@
     </p:spTree>
     <p:extLst>
       <p:ext uri="{BB962C8B-B14F-4D97-AF65-F5344CB8AC3E}">
-        <p14:creationId xmlns:p14="http://schemas.microsoft.com/office/powerpoint/2010/main" val="1419587592"/>
+        <p14:creationId xmlns:p14="http://schemas.microsoft.com/office/powerpoint/2010/main" val="1668086761"/>
       </p:ext>
     </p:extLst>
   </p:cSld>
@@ -5031,22 +5120,28 @@
       </p:sp>
       <p:pic>
         <p:nvPicPr>
-          <p:cNvPr id="4" name="Picture 3"/>
+          <p:cNvPr id="6" name="Picture 5"/>
           <p:cNvPicPr>
             <a:picLocks noChangeAspect="1"/>
           </p:cNvPicPr>
           <p:nvPr/>
         </p:nvPicPr>
         <p:blipFill>
-          <a:blip r:embed="rId2"/>
+          <a:blip r:embed="rId2">
+            <a:extLst>
+              <a:ext uri="{28A0092B-C50C-407E-A947-70E740481C1C}">
+                <a14:useLocalDpi xmlns:a14="http://schemas.microsoft.com/office/drawing/2010/main" val="0"/>
+              </a:ext>
+            </a:extLst>
+          </a:blip>
           <a:stretch>
             <a:fillRect/>
           </a:stretch>
         </p:blipFill>
         <p:spPr>
           <a:xfrm>
-            <a:off x="0" y="1673"/>
-            <a:ext cx="12192000" cy="6327875"/>
+            <a:off x="0" y="0"/>
+            <a:ext cx="12192000" cy="6341423"/>
           </a:xfrm>
           <a:prstGeom prst="rect">
             <a:avLst/>
@@ -5056,7 +5151,7 @@
     </p:spTree>
     <p:extLst>
       <p:ext uri="{BB962C8B-B14F-4D97-AF65-F5344CB8AC3E}">
-        <p14:creationId xmlns:p14="http://schemas.microsoft.com/office/powerpoint/2010/main" val="3414741901"/>
+        <p14:creationId xmlns:p14="http://schemas.microsoft.com/office/powerpoint/2010/main" val="564952657"/>
       </p:ext>
     </p:extLst>
   </p:cSld>
@@ -5137,8 +5232,8 @@
         </p:blipFill>
         <p:spPr>
           <a:xfrm>
-            <a:off x="0" y="1674"/>
-            <a:ext cx="12192000" cy="6316000"/>
+            <a:off x="0" y="-33952"/>
+            <a:ext cx="12192000" cy="6304124"/>
           </a:xfrm>
           <a:prstGeom prst="rect">
             <a:avLst/>
@@ -5148,7 +5243,7 @@
     </p:spTree>
     <p:extLst>
       <p:ext uri="{BB962C8B-B14F-4D97-AF65-F5344CB8AC3E}">
-        <p14:creationId xmlns:p14="http://schemas.microsoft.com/office/powerpoint/2010/main" val="2102034956"/>
+        <p14:creationId xmlns:p14="http://schemas.microsoft.com/office/powerpoint/2010/main" val="938735046"/>
       </p:ext>
     </p:extLst>
   </p:cSld>
@@ -5240,7 +5335,7 @@
     </p:spTree>
     <p:extLst>
       <p:ext uri="{BB962C8B-B14F-4D97-AF65-F5344CB8AC3E}">
-        <p14:creationId xmlns:p14="http://schemas.microsoft.com/office/powerpoint/2010/main" val="2521665562"/>
+        <p14:creationId xmlns:p14="http://schemas.microsoft.com/office/powerpoint/2010/main" val="2999014714"/>
       </p:ext>
     </p:extLst>
   </p:cSld>
@@ -5321,8 +5416,8 @@
         </p:blipFill>
         <p:spPr>
           <a:xfrm>
-            <a:off x="0" y="1674"/>
-            <a:ext cx="12192000" cy="6292248"/>
+            <a:off x="0" y="1673"/>
+            <a:ext cx="12192000" cy="6327875"/>
           </a:xfrm>
           <a:prstGeom prst="rect">
             <a:avLst/>
@@ -5332,7 +5427,99 @@
     </p:spTree>
     <p:extLst>
       <p:ext uri="{BB962C8B-B14F-4D97-AF65-F5344CB8AC3E}">
-        <p14:creationId xmlns:p14="http://schemas.microsoft.com/office/powerpoint/2010/main" val="1669160383"/>
+        <p14:creationId xmlns:p14="http://schemas.microsoft.com/office/powerpoint/2010/main" val="1419587592"/>
+      </p:ext>
+    </p:extLst>
+  </p:cSld>
+  <p:clrMapOvr>
+    <a:masterClrMapping/>
+  </p:clrMapOvr>
+</p:sld>
+</file>
+
+<file path=ppt/slides/slide29.xml><?xml version="1.0" encoding="utf-8"?>
+<p:sld xmlns:a="http://schemas.openxmlformats.org/drawingml/2006/main" xmlns:r="http://schemas.openxmlformats.org/officeDocument/2006/relationships" xmlns:p="http://schemas.openxmlformats.org/presentationml/2006/main">
+  <p:cSld>
+    <p:spTree>
+      <p:nvGrpSpPr>
+        <p:cNvPr id="1" name=""/>
+        <p:cNvGrpSpPr/>
+        <p:nvPr/>
+      </p:nvGrpSpPr>
+      <p:grpSpPr>
+        <a:xfrm>
+          <a:off x="0" y="0"/>
+          <a:ext cx="0" cy="0"/>
+          <a:chOff x="0" y="0"/>
+          <a:chExt cx="0" cy="0"/>
+        </a:xfrm>
+      </p:grpSpPr>
+      <p:sp>
+        <p:nvSpPr>
+          <p:cNvPr id="2" name="Title 1"/>
+          <p:cNvSpPr>
+            <a:spLocks noGrp="1"/>
+          </p:cNvSpPr>
+          <p:nvPr>
+            <p:ph type="title"/>
+          </p:nvPr>
+        </p:nvSpPr>
+        <p:spPr/>
+        <p:txBody>
+          <a:bodyPr/>
+          <a:lstStyle/>
+          <a:p>
+            <a:endParaRPr lang="en-US"/>
+          </a:p>
+        </p:txBody>
+      </p:sp>
+      <p:sp>
+        <p:nvSpPr>
+          <p:cNvPr id="3" name="Subtitle 2"/>
+          <p:cNvSpPr>
+            <a:spLocks noGrp="1"/>
+          </p:cNvSpPr>
+          <p:nvPr>
+            <p:ph type="subTitle"/>
+          </p:nvPr>
+        </p:nvSpPr>
+        <p:spPr/>
+        <p:txBody>
+          <a:bodyPr/>
+          <a:lstStyle/>
+          <a:p>
+            <a:endParaRPr lang="en-US"/>
+          </a:p>
+        </p:txBody>
+      </p:sp>
+      <p:pic>
+        <p:nvPicPr>
+          <p:cNvPr id="4" name="Picture 3"/>
+          <p:cNvPicPr>
+            <a:picLocks noChangeAspect="1"/>
+          </p:cNvPicPr>
+          <p:nvPr/>
+        </p:nvPicPr>
+        <p:blipFill>
+          <a:blip r:embed="rId2"/>
+          <a:stretch>
+            <a:fillRect/>
+          </a:stretch>
+        </p:blipFill>
+        <p:spPr>
+          <a:xfrm>
+            <a:off x="0" y="1673"/>
+            <a:ext cx="12192000" cy="6327875"/>
+          </a:xfrm>
+          <a:prstGeom prst="rect">
+            <a:avLst/>
+          </a:prstGeom>
+        </p:spPr>
+      </p:pic>
+    </p:spTree>
+    <p:extLst>
+      <p:ext uri="{BB962C8B-B14F-4D97-AF65-F5344CB8AC3E}">
+        <p14:creationId xmlns:p14="http://schemas.microsoft.com/office/powerpoint/2010/main" val="3414741901"/>
       </p:ext>
     </p:extLst>
   </p:cSld>
@@ -5369,7 +5556,7 @@
       </p:grpSpPr>
       <p:sp>
         <p:nvSpPr>
-          <p:cNvPr id="91" name="TextShape 1"/>
+          <p:cNvPr id="89" name="TextShape 1"/>
           <p:cNvSpPr txBox="1"/>
           <p:nvPr/>
         </p:nvSpPr>
@@ -5396,7 +5583,7 @@
               </a:lnSpc>
             </a:pPr>
             <a:r>
-              <a:rPr lang="en-US" sz="4800" b="1" strike="noStrike" spc="-49">
+              <a:rPr lang="en-US" sz="4800" b="1" strike="noStrike" spc="-49" dirty="0">
                 <a:solidFill>
                   <a:srgbClr val="404040"/>
                 </a:solidFill>
@@ -5407,9 +5594,9 @@
                 </a:uFill>
                 <a:latin typeface="Calibri Light"/>
               </a:rPr>
-              <a:t>Description</a:t>
+              <a:t>Problem</a:t>
             </a:r>
-            <a:endParaRPr lang="en-US" sz="1800" b="0" strike="noStrike" spc="-1">
+            <a:endParaRPr lang="en-US" sz="1800" b="0" strike="noStrike" spc="-1" dirty="0">
               <a:solidFill>
                 <a:srgbClr val="000000"/>
               </a:solidFill>
@@ -5425,7 +5612,7 @@
       </p:sp>
       <p:sp>
         <p:nvSpPr>
-          <p:cNvPr id="92" name="TextShape 2"/>
+          <p:cNvPr id="90" name="TextShape 2"/>
           <p:cNvSpPr txBox="1"/>
           <p:nvPr/>
         </p:nvSpPr>
@@ -5445,6 +5632,40 @@
         <p:txBody>
           <a:bodyPr lIns="0" rIns="0"/>
           <a:lstStyle/>
+          <a:p>
+            <a:pPr marL="384120" lvl="1" indent="-182520">
+              <a:buClr>
+                <a:srgbClr val="9DBFBE"/>
+              </a:buClr>
+              <a:buFont typeface="Arial"/>
+              <a:buChar char="•"/>
+            </a:pPr>
+            <a:r>
+              <a:rPr lang="en-US" sz="2400" spc="-1" dirty="0">
+                <a:solidFill>
+                  <a:srgbClr val="404040"/>
+                </a:solidFill>
+                <a:uFill>
+                  <a:solidFill>
+                    <a:srgbClr val="FFFFFF"/>
+                  </a:solidFill>
+                </a:uFill>
+                <a:latin typeface="Calibri"/>
+              </a:rPr>
+              <a:t>Lack of communication and coordination</a:t>
+            </a:r>
+            <a:endParaRPr lang="en-US" sz="1400" spc="-1" dirty="0">
+              <a:solidFill>
+                <a:srgbClr val="404040"/>
+              </a:solidFill>
+              <a:uFill>
+                <a:solidFill>
+                  <a:srgbClr val="FFFFFF"/>
+                </a:solidFill>
+              </a:uFill>
+              <a:latin typeface="Calibri"/>
+            </a:endParaRPr>
+          </a:p>
           <a:p>
             <a:pPr marL="384120" lvl="1" indent="-182520">
               <a:lnSpc>
@@ -5453,11 +5674,34 @@
               <a:buClr>
                 <a:srgbClr val="9DBFBE"/>
               </a:buClr>
-              <a:buFont typeface="Calibri"/>
-              <a:buChar char="◦"/>
+              <a:buFont typeface="Arial"/>
+              <a:buChar char="•"/>
+            </a:pPr>
+            <a:endParaRPr lang="en-US" sz="2400" b="0" strike="noStrike" spc="-1" dirty="0">
+              <a:solidFill>
+                <a:srgbClr val="404040"/>
+              </a:solidFill>
+              <a:uFill>
+                <a:solidFill>
+                  <a:srgbClr val="FFFFFF"/>
+                </a:solidFill>
+              </a:uFill>
+              <a:latin typeface="Calibri"/>
+            </a:endParaRPr>
+          </a:p>
+          <a:p>
+            <a:pPr marL="384120" lvl="1" indent="-182520">
+              <a:lnSpc>
+                <a:spcPct val="100000"/>
+              </a:lnSpc>
+              <a:buClr>
+                <a:srgbClr val="9DBFBE"/>
+              </a:buClr>
+              <a:buFont typeface="Arial"/>
+              <a:buChar char="•"/>
             </a:pPr>
             <a:r>
-              <a:rPr lang="en-US" sz="2400" b="0" strike="noStrike" spc="-1">
+              <a:rPr lang="en-US" sz="2400" b="0" strike="noStrike" spc="-1" dirty="0">
                 <a:solidFill>
                   <a:srgbClr val="404040"/>
                 </a:solidFill>
@@ -5468,9 +5712,9 @@
                 </a:uFill>
                 <a:latin typeface="Calibri"/>
               </a:rPr>
-              <a:t>Tracks relevant data from different NDRRMC independent systems (e.g. Logistics, Inventory, Procurement, etc.) </a:t>
+              <a:t>Lack of capacity and technical expertise</a:t>
             </a:r>
-            <a:endParaRPr lang="en-US" sz="1400" b="0" strike="noStrike" spc="-1">
+            <a:endParaRPr lang="en-US" sz="1400" b="0" strike="noStrike" spc="-1" dirty="0">
               <a:solidFill>
                 <a:srgbClr val="404040"/>
               </a:solidFill>
@@ -5483,7 +5727,7 @@
             </a:endParaRPr>
           </a:p>
           <a:p>
-            <a:endParaRPr lang="en-US" sz="2000" b="0" strike="noStrike" spc="-1">
+            <a:endParaRPr lang="en-US" sz="2000" b="0" strike="noStrike" spc="-1" dirty="0">
               <a:solidFill>
                 <a:srgbClr val="404040"/>
               </a:solidFill>
@@ -5503,11 +5747,11 @@
               <a:buClr>
                 <a:srgbClr val="9DBFBE"/>
               </a:buClr>
-              <a:buFont typeface="Calibri"/>
-              <a:buChar char="◦"/>
+              <a:buFont typeface="Arial"/>
+              <a:buChar char="•"/>
             </a:pPr>
             <a:r>
-              <a:rPr lang="en-US" sz="2400" b="0" strike="noStrike" spc="-1">
+              <a:rPr lang="en-US" sz="2400" b="0" strike="noStrike" spc="-1" dirty="0">
                 <a:solidFill>
                   <a:srgbClr val="404040"/>
                 </a:solidFill>
@@ -5518,9 +5762,9 @@
                 </a:uFill>
                 <a:latin typeface="Calibri"/>
               </a:rPr>
-              <a:t>NDRRMC admin sends report for Law and Order </a:t>
+              <a:t>Lack of public awareness or the threats and impacts of all types of hazards</a:t>
             </a:r>
-            <a:endParaRPr lang="en-US" sz="1400" b="0" strike="noStrike" spc="-1">
+            <a:endParaRPr lang="en-US" sz="1400" b="0" strike="noStrike" spc="-1" dirty="0">
               <a:solidFill>
                 <a:srgbClr val="404040"/>
               </a:solidFill>
@@ -5533,7 +5777,7 @@
             </a:endParaRPr>
           </a:p>
           <a:p>
-            <a:endParaRPr lang="en-US" sz="2000" b="0" strike="noStrike" spc="-1">
+            <a:endParaRPr lang="en-US" sz="2000" b="0" strike="noStrike" spc="-1" dirty="0">
               <a:solidFill>
                 <a:srgbClr val="404040"/>
               </a:solidFill>
@@ -5553,11 +5797,11 @@
               <a:buClr>
                 <a:srgbClr val="9DBFBE"/>
               </a:buClr>
-              <a:buFont typeface="Calibri"/>
-              <a:buChar char="◦"/>
+              <a:buFont typeface="Arial"/>
+              <a:buChar char="•"/>
             </a:pPr>
             <a:r>
-              <a:rPr lang="en-US" sz="2400" b="0" strike="noStrike" spc="-1">
+              <a:rPr lang="en-US" sz="2400" b="0" strike="noStrike" spc="-1" dirty="0">
                 <a:solidFill>
                   <a:srgbClr val="404040"/>
                 </a:solidFill>
@@ -5568,9 +5812,22 @@
                 </a:uFill>
                 <a:latin typeface="Calibri"/>
               </a:rPr>
-              <a:t>LGU admins receive a notification about the upcoming disaster details</a:t>
+              <a:t>Lack of necessary skills to cope with the impacts of disaster</a:t>
             </a:r>
-            <a:endParaRPr lang="en-US" sz="1400" b="0" strike="noStrike" spc="-1">
+            <a:endParaRPr lang="en-US" sz="1400" b="0" strike="noStrike" spc="-1" dirty="0">
+              <a:solidFill>
+                <a:srgbClr val="404040"/>
+              </a:solidFill>
+              <a:uFill>
+                <a:solidFill>
+                  <a:srgbClr val="FFFFFF"/>
+                </a:solidFill>
+              </a:uFill>
+              <a:latin typeface="Calibri"/>
+            </a:endParaRPr>
+          </a:p>
+          <a:p>
+            <a:endParaRPr lang="en-US" sz="2000" b="0" strike="noStrike" spc="-1" dirty="0">
               <a:solidFill>
                 <a:srgbClr val="404040"/>
               </a:solidFill>
@@ -5588,7 +5845,7 @@
                 <a:spcPct val="90000"/>
               </a:lnSpc>
             </a:pPr>
-            <a:endParaRPr lang="en-US" sz="2000" b="0" strike="noStrike" spc="-1">
+            <a:endParaRPr lang="en-US" sz="2000" b="0" strike="noStrike" spc="-1" dirty="0">
               <a:solidFill>
                 <a:srgbClr val="404040"/>
               </a:solidFill>
@@ -5603,6 +5860,517 @@
         </p:txBody>
       </p:sp>
     </p:spTree>
+  </p:cSld>
+  <p:clrMapOvr>
+    <a:masterClrMapping/>
+  </p:clrMapOvr>
+  <p:timing>
+    <p:tnLst>
+      <p:par>
+        <p:cTn id="1" dur="indefinite" restart="never" nodeType="tmRoot">
+          <p:childTnLst>
+            <p:seq>
+              <p:cTn id="2" nodeType="mainSeq"/>
+              <p:prevCondLst>
+                <p:cond evt="onPrev" delay="0">
+                  <p:tgtEl>
+                    <p:sldTgt/>
+                  </p:tgtEl>
+                </p:cond>
+              </p:prevCondLst>
+              <p:nextCondLst>
+                <p:cond evt="onNext" delay="0">
+                  <p:tgtEl>
+                    <p:sldTgt/>
+                  </p:tgtEl>
+                </p:cond>
+              </p:nextCondLst>
+            </p:seq>
+          </p:childTnLst>
+        </p:cTn>
+      </p:par>
+    </p:tnLst>
+  </p:timing>
+</p:sld>
+</file>
+
+<file path=ppt/slides/slide30.xml><?xml version="1.0" encoding="utf-8"?>
+<p:sld xmlns:a="http://schemas.openxmlformats.org/drawingml/2006/main" xmlns:r="http://schemas.openxmlformats.org/officeDocument/2006/relationships" xmlns:p="http://schemas.openxmlformats.org/presentationml/2006/main">
+  <p:cSld>
+    <p:spTree>
+      <p:nvGrpSpPr>
+        <p:cNvPr id="1" name=""/>
+        <p:cNvGrpSpPr/>
+        <p:nvPr/>
+      </p:nvGrpSpPr>
+      <p:grpSpPr>
+        <a:xfrm>
+          <a:off x="0" y="0"/>
+          <a:ext cx="0" cy="0"/>
+          <a:chOff x="0" y="0"/>
+          <a:chExt cx="0" cy="0"/>
+        </a:xfrm>
+      </p:grpSpPr>
+      <p:sp>
+        <p:nvSpPr>
+          <p:cNvPr id="2" name="Title 1"/>
+          <p:cNvSpPr>
+            <a:spLocks noGrp="1"/>
+          </p:cNvSpPr>
+          <p:nvPr>
+            <p:ph type="title"/>
+          </p:nvPr>
+        </p:nvSpPr>
+        <p:spPr/>
+        <p:txBody>
+          <a:bodyPr/>
+          <a:lstStyle/>
+          <a:p>
+            <a:endParaRPr lang="en-US"/>
+          </a:p>
+        </p:txBody>
+      </p:sp>
+      <p:sp>
+        <p:nvSpPr>
+          <p:cNvPr id="3" name="Subtitle 2"/>
+          <p:cNvSpPr>
+            <a:spLocks noGrp="1"/>
+          </p:cNvSpPr>
+          <p:nvPr>
+            <p:ph type="subTitle"/>
+          </p:nvPr>
+        </p:nvSpPr>
+        <p:spPr/>
+        <p:txBody>
+          <a:bodyPr/>
+          <a:lstStyle/>
+          <a:p>
+            <a:endParaRPr lang="en-US"/>
+          </a:p>
+        </p:txBody>
+      </p:sp>
+      <p:pic>
+        <p:nvPicPr>
+          <p:cNvPr id="4" name="Picture 3"/>
+          <p:cNvPicPr>
+            <a:picLocks noChangeAspect="1"/>
+          </p:cNvPicPr>
+          <p:nvPr/>
+        </p:nvPicPr>
+        <p:blipFill>
+          <a:blip r:embed="rId2"/>
+          <a:stretch>
+            <a:fillRect/>
+          </a:stretch>
+        </p:blipFill>
+        <p:spPr>
+          <a:xfrm>
+            <a:off x="0" y="1674"/>
+            <a:ext cx="12192000" cy="6316000"/>
+          </a:xfrm>
+          <a:prstGeom prst="rect">
+            <a:avLst/>
+          </a:prstGeom>
+        </p:spPr>
+      </p:pic>
+    </p:spTree>
+    <p:extLst>
+      <p:ext uri="{BB962C8B-B14F-4D97-AF65-F5344CB8AC3E}">
+        <p14:creationId xmlns:p14="http://schemas.microsoft.com/office/powerpoint/2010/main" val="2102034956"/>
+      </p:ext>
+    </p:extLst>
+  </p:cSld>
+  <p:clrMapOvr>
+    <a:masterClrMapping/>
+  </p:clrMapOvr>
+</p:sld>
+</file>
+
+<file path=ppt/slides/slide31.xml><?xml version="1.0" encoding="utf-8"?>
+<p:sld xmlns:a="http://schemas.openxmlformats.org/drawingml/2006/main" xmlns:r="http://schemas.openxmlformats.org/officeDocument/2006/relationships" xmlns:p="http://schemas.openxmlformats.org/presentationml/2006/main">
+  <p:cSld>
+    <p:spTree>
+      <p:nvGrpSpPr>
+        <p:cNvPr id="1" name=""/>
+        <p:cNvGrpSpPr/>
+        <p:nvPr/>
+      </p:nvGrpSpPr>
+      <p:grpSpPr>
+        <a:xfrm>
+          <a:off x="0" y="0"/>
+          <a:ext cx="0" cy="0"/>
+          <a:chOff x="0" y="0"/>
+          <a:chExt cx="0" cy="0"/>
+        </a:xfrm>
+      </p:grpSpPr>
+      <p:sp>
+        <p:nvSpPr>
+          <p:cNvPr id="2" name="Title 1"/>
+          <p:cNvSpPr>
+            <a:spLocks noGrp="1"/>
+          </p:cNvSpPr>
+          <p:nvPr>
+            <p:ph type="title"/>
+          </p:nvPr>
+        </p:nvSpPr>
+        <p:spPr/>
+        <p:txBody>
+          <a:bodyPr/>
+          <a:lstStyle/>
+          <a:p>
+            <a:endParaRPr lang="en-US"/>
+          </a:p>
+        </p:txBody>
+      </p:sp>
+      <p:sp>
+        <p:nvSpPr>
+          <p:cNvPr id="3" name="Subtitle 2"/>
+          <p:cNvSpPr>
+            <a:spLocks noGrp="1"/>
+          </p:cNvSpPr>
+          <p:nvPr>
+            <p:ph type="subTitle"/>
+          </p:nvPr>
+        </p:nvSpPr>
+        <p:spPr/>
+        <p:txBody>
+          <a:bodyPr/>
+          <a:lstStyle/>
+          <a:p>
+            <a:endParaRPr lang="en-US"/>
+          </a:p>
+        </p:txBody>
+      </p:sp>
+      <p:pic>
+        <p:nvPicPr>
+          <p:cNvPr id="4" name="Picture 3"/>
+          <p:cNvPicPr>
+            <a:picLocks noChangeAspect="1"/>
+          </p:cNvPicPr>
+          <p:nvPr/>
+        </p:nvPicPr>
+        <p:blipFill>
+          <a:blip r:embed="rId2"/>
+          <a:stretch>
+            <a:fillRect/>
+          </a:stretch>
+        </p:blipFill>
+        <p:spPr>
+          <a:xfrm>
+            <a:off x="0" y="1674"/>
+            <a:ext cx="12192000" cy="6351626"/>
+          </a:xfrm>
+          <a:prstGeom prst="rect">
+            <a:avLst/>
+          </a:prstGeom>
+        </p:spPr>
+      </p:pic>
+    </p:spTree>
+    <p:extLst>
+      <p:ext uri="{BB962C8B-B14F-4D97-AF65-F5344CB8AC3E}">
+        <p14:creationId xmlns:p14="http://schemas.microsoft.com/office/powerpoint/2010/main" val="2521665562"/>
+      </p:ext>
+    </p:extLst>
+  </p:cSld>
+  <p:clrMapOvr>
+    <a:masterClrMapping/>
+  </p:clrMapOvr>
+</p:sld>
+</file>
+
+<file path=ppt/slides/slide32.xml><?xml version="1.0" encoding="utf-8"?>
+<p:sld xmlns:a="http://schemas.openxmlformats.org/drawingml/2006/main" xmlns:r="http://schemas.openxmlformats.org/officeDocument/2006/relationships" xmlns:p="http://schemas.openxmlformats.org/presentationml/2006/main">
+  <p:cSld>
+    <p:spTree>
+      <p:nvGrpSpPr>
+        <p:cNvPr id="1" name=""/>
+        <p:cNvGrpSpPr/>
+        <p:nvPr/>
+      </p:nvGrpSpPr>
+      <p:grpSpPr>
+        <a:xfrm>
+          <a:off x="0" y="0"/>
+          <a:ext cx="0" cy="0"/>
+          <a:chOff x="0" y="0"/>
+          <a:chExt cx="0" cy="0"/>
+        </a:xfrm>
+      </p:grpSpPr>
+      <p:sp>
+        <p:nvSpPr>
+          <p:cNvPr id="2" name="Title 1"/>
+          <p:cNvSpPr>
+            <a:spLocks noGrp="1"/>
+          </p:cNvSpPr>
+          <p:nvPr>
+            <p:ph type="title"/>
+          </p:nvPr>
+        </p:nvSpPr>
+        <p:spPr/>
+        <p:txBody>
+          <a:bodyPr/>
+          <a:lstStyle/>
+          <a:p>
+            <a:endParaRPr lang="en-US"/>
+          </a:p>
+        </p:txBody>
+      </p:sp>
+      <p:sp>
+        <p:nvSpPr>
+          <p:cNvPr id="3" name="Subtitle 2"/>
+          <p:cNvSpPr>
+            <a:spLocks noGrp="1"/>
+          </p:cNvSpPr>
+          <p:nvPr>
+            <p:ph type="subTitle"/>
+          </p:nvPr>
+        </p:nvSpPr>
+        <p:spPr/>
+        <p:txBody>
+          <a:bodyPr/>
+          <a:lstStyle/>
+          <a:p>
+            <a:endParaRPr lang="en-US"/>
+          </a:p>
+        </p:txBody>
+      </p:sp>
+      <p:pic>
+        <p:nvPicPr>
+          <p:cNvPr id="4" name="Picture 3"/>
+          <p:cNvPicPr>
+            <a:picLocks noChangeAspect="1"/>
+          </p:cNvPicPr>
+          <p:nvPr/>
+        </p:nvPicPr>
+        <p:blipFill>
+          <a:blip r:embed="rId2"/>
+          <a:stretch>
+            <a:fillRect/>
+          </a:stretch>
+        </p:blipFill>
+        <p:spPr>
+          <a:xfrm>
+            <a:off x="0" y="1674"/>
+            <a:ext cx="12192000" cy="6292248"/>
+          </a:xfrm>
+          <a:prstGeom prst="rect">
+            <a:avLst/>
+          </a:prstGeom>
+        </p:spPr>
+      </p:pic>
+    </p:spTree>
+    <p:extLst>
+      <p:ext uri="{BB962C8B-B14F-4D97-AF65-F5344CB8AC3E}">
+        <p14:creationId xmlns:p14="http://schemas.microsoft.com/office/powerpoint/2010/main" val="1669160383"/>
+      </p:ext>
+    </p:extLst>
+  </p:cSld>
+  <p:clrMapOvr>
+    <a:masterClrMapping/>
+  </p:clrMapOvr>
+</p:sld>
+</file>
+
+<file path=ppt/slides/slide33.xml><?xml version="1.0" encoding="utf-8"?>
+<p:sld xmlns:a="http://schemas.openxmlformats.org/drawingml/2006/main" xmlns:r="http://schemas.openxmlformats.org/officeDocument/2006/relationships" xmlns:p="http://schemas.openxmlformats.org/presentationml/2006/main">
+  <p:cSld>
+    <p:spTree>
+      <p:nvGrpSpPr>
+        <p:cNvPr id="1" name=""/>
+        <p:cNvGrpSpPr/>
+        <p:nvPr/>
+      </p:nvGrpSpPr>
+      <p:grpSpPr>
+        <a:xfrm>
+          <a:off x="0" y="0"/>
+          <a:ext cx="0" cy="0"/>
+          <a:chOff x="0" y="0"/>
+          <a:chExt cx="0" cy="0"/>
+        </a:xfrm>
+      </p:grpSpPr>
+      <p:sp>
+        <p:nvSpPr>
+          <p:cNvPr id="2" name="Title 1"/>
+          <p:cNvSpPr>
+            <a:spLocks noGrp="1"/>
+          </p:cNvSpPr>
+          <p:nvPr>
+            <p:ph type="title"/>
+          </p:nvPr>
+        </p:nvSpPr>
+        <p:spPr/>
+        <p:txBody>
+          <a:bodyPr/>
+          <a:lstStyle/>
+          <a:p>
+            <a:endParaRPr lang="en-US"/>
+          </a:p>
+        </p:txBody>
+      </p:sp>
+      <p:sp>
+        <p:nvSpPr>
+          <p:cNvPr id="3" name="Subtitle 2"/>
+          <p:cNvSpPr>
+            <a:spLocks noGrp="1"/>
+          </p:cNvSpPr>
+          <p:nvPr>
+            <p:ph type="subTitle"/>
+          </p:nvPr>
+        </p:nvSpPr>
+        <p:spPr/>
+        <p:txBody>
+          <a:bodyPr/>
+          <a:lstStyle/>
+          <a:p>
+            <a:endParaRPr lang="en-US"/>
+          </a:p>
+        </p:txBody>
+      </p:sp>
+      <p:pic>
+        <p:nvPicPr>
+          <p:cNvPr id="4" name="Picture 3"/>
+          <p:cNvPicPr>
+            <a:picLocks noChangeAspect="1"/>
+          </p:cNvPicPr>
+          <p:nvPr/>
+        </p:nvPicPr>
+        <p:blipFill>
+          <a:blip r:embed="rId2"/>
+          <a:stretch>
+            <a:fillRect/>
+          </a:stretch>
+        </p:blipFill>
+        <p:spPr>
+          <a:xfrm>
+            <a:off x="0" y="1674"/>
+            <a:ext cx="12192000" cy="6304124"/>
+          </a:xfrm>
+          <a:prstGeom prst="rect">
+            <a:avLst/>
+          </a:prstGeom>
+        </p:spPr>
+      </p:pic>
+    </p:spTree>
+    <p:extLst>
+      <p:ext uri="{BB962C8B-B14F-4D97-AF65-F5344CB8AC3E}">
+        <p14:creationId xmlns:p14="http://schemas.microsoft.com/office/powerpoint/2010/main" val="1872674624"/>
+      </p:ext>
+    </p:extLst>
+  </p:cSld>
+  <p:clrMapOvr>
+    <a:masterClrMapping/>
+  </p:clrMapOvr>
+</p:sld>
+</file>
+
+<file path=ppt/slides/slide34.xml><?xml version="1.0" encoding="utf-8"?>
+<p:sld xmlns:a="http://schemas.openxmlformats.org/drawingml/2006/main" xmlns:r="http://schemas.openxmlformats.org/officeDocument/2006/relationships" xmlns:p="http://schemas.openxmlformats.org/presentationml/2006/main">
+  <p:cSld>
+    <p:bg>
+      <p:bgPr>
+        <a:solidFill>
+          <a:srgbClr val="FFFFFF"/>
+        </a:solidFill>
+        <a:effectLst/>
+      </p:bgPr>
+    </p:bg>
+    <p:spTree>
+      <p:nvGrpSpPr>
+        <p:cNvPr id="1" name=""/>
+        <p:cNvGrpSpPr/>
+        <p:nvPr/>
+      </p:nvGrpSpPr>
+      <p:grpSpPr>
+        <a:xfrm>
+          <a:off x="0" y="0"/>
+          <a:ext cx="0" cy="0"/>
+          <a:chOff x="0" y="0"/>
+          <a:chExt cx="0" cy="0"/>
+        </a:xfrm>
+      </p:grpSpPr>
+      <p:sp>
+        <p:nvSpPr>
+          <p:cNvPr id="87" name="TextShape 1"/>
+          <p:cNvSpPr txBox="1"/>
+          <p:nvPr/>
+        </p:nvSpPr>
+        <p:spPr>
+          <a:xfrm>
+            <a:off x="1097280" y="758880"/>
+            <a:ext cx="10058040" cy="3565800"/>
+          </a:xfrm>
+          <a:prstGeom prst="rect">
+            <a:avLst/>
+          </a:prstGeom>
+          <a:noFill/>
+          <a:ln>
+            <a:noFill/>
+          </a:ln>
+        </p:spPr>
+        <p:txBody>
+          <a:bodyPr anchor="b"/>
+          <a:lstStyle/>
+          <a:p>
+            <a:pPr algn="ctr">
+              <a:lnSpc>
+                <a:spcPct val="85000"/>
+              </a:lnSpc>
+            </a:pPr>
+            <a:endParaRPr lang="en-US" sz="6500" b="1" strike="noStrike" spc="-49" dirty="0">
+              <a:solidFill>
+                <a:srgbClr val="262626"/>
+              </a:solidFill>
+              <a:uFill>
+                <a:solidFill>
+                  <a:srgbClr val="FFFFFF"/>
+                </a:solidFill>
+              </a:uFill>
+              <a:latin typeface="Calibri Light"/>
+            </a:endParaRPr>
+          </a:p>
+          <a:p>
+            <a:pPr algn="ctr">
+              <a:lnSpc>
+                <a:spcPct val="85000"/>
+              </a:lnSpc>
+            </a:pPr>
+            <a:endParaRPr lang="en-US" sz="6500" b="1" spc="-49" dirty="0">
+              <a:solidFill>
+                <a:srgbClr val="262626"/>
+              </a:solidFill>
+              <a:uFill>
+                <a:solidFill>
+                  <a:srgbClr val="FFFFFF"/>
+                </a:solidFill>
+              </a:uFill>
+              <a:latin typeface="Calibri Light"/>
+            </a:endParaRPr>
+          </a:p>
+          <a:p>
+            <a:pPr algn="ctr">
+              <a:lnSpc>
+                <a:spcPct val="85000"/>
+              </a:lnSpc>
+            </a:pPr>
+            <a:endParaRPr lang="en-US" sz="1800" b="0" strike="noStrike" spc="-1" dirty="0">
+              <a:solidFill>
+                <a:srgbClr val="000000"/>
+              </a:solidFill>
+              <a:uFill>
+                <a:solidFill>
+                  <a:srgbClr val="FFFFFF"/>
+                </a:solidFill>
+              </a:uFill>
+              <a:latin typeface="Calibri"/>
+            </a:endParaRPr>
+          </a:p>
+        </p:txBody>
+      </p:sp>
+    </p:spTree>
+    <p:extLst>
+      <p:ext uri="{BB962C8B-B14F-4D97-AF65-F5344CB8AC3E}">
+        <p14:creationId xmlns:p14="http://schemas.microsoft.com/office/powerpoint/2010/main" val="3193406394"/>
+      </p:ext>
+    </p:extLst>
   </p:cSld>
   <p:clrMapOvr>
     <a:masterClrMapping/>
@@ -6044,7 +6812,7 @@
       </p:grpSpPr>
       <p:sp>
         <p:nvSpPr>
-          <p:cNvPr id="95" name="TextShape 1"/>
+          <p:cNvPr id="91" name="TextShape 1"/>
           <p:cNvSpPr txBox="1"/>
           <p:nvPr/>
         </p:nvSpPr>
@@ -6071,7 +6839,7 @@
               </a:lnSpc>
             </a:pPr>
             <a:r>
-              <a:rPr lang="en-US" sz="4800" b="1" strike="noStrike" spc="-49" dirty="0">
+              <a:rPr lang="en-US" sz="4800" b="1" strike="noStrike" spc="-49">
                 <a:solidFill>
                   <a:srgbClr val="404040"/>
                 </a:solidFill>
@@ -6082,9 +6850,9 @@
                 </a:uFill>
                 <a:latin typeface="Calibri Light"/>
               </a:rPr>
-              <a:t>Target User</a:t>
+              <a:t>Description</a:t>
             </a:r>
-            <a:endParaRPr lang="en-US" sz="1800" b="0" strike="noStrike" spc="-1" dirty="0">
+            <a:endParaRPr lang="en-US" sz="1800" b="0" strike="noStrike" spc="-1">
               <a:solidFill>
                 <a:srgbClr val="000000"/>
               </a:solidFill>
@@ -6098,41 +6866,228 @@
           </a:p>
         </p:txBody>
       </p:sp>
-      <p:pic>
-        <p:nvPicPr>
-          <p:cNvPr id="2" name="Picture 1"/>
-          <p:cNvPicPr>
-            <a:picLocks noChangeAspect="1"/>
-          </p:cNvPicPr>
+      <p:sp>
+        <p:nvSpPr>
+          <p:cNvPr id="92" name="TextShape 2"/>
+          <p:cNvSpPr txBox="1"/>
           <p:nvPr/>
-        </p:nvPicPr>
-        <p:blipFill rotWithShape="1">
-          <a:blip r:embed="rId2">
-            <a:extLst>
-              <a:ext uri="{28A0092B-C50C-407E-A947-70E740481C1C}">
-                <a14:useLocalDpi xmlns:a14="http://schemas.microsoft.com/office/drawing/2010/main" val="0"/>
-              </a:ext>
-            </a:extLst>
-          </a:blip>
-          <a:srcRect l="18932"/>
-          <a:stretch/>
-        </p:blipFill>
-        <p:spPr>
-          <a:xfrm>
-            <a:off x="1816101" y="1902541"/>
-            <a:ext cx="8136968" cy="4284325"/>
-          </a:xfrm>
-          <a:prstGeom prst="rect">
-            <a:avLst/>
-          </a:prstGeom>
-        </p:spPr>
-      </p:pic>
+        </p:nvSpPr>
+        <p:spPr>
+          <a:xfrm>
+            <a:off x="1097280" y="1845720"/>
+            <a:ext cx="10058040" cy="4023000"/>
+          </a:xfrm>
+          <a:prstGeom prst="rect">
+            <a:avLst/>
+          </a:prstGeom>
+          <a:noFill/>
+          <a:ln>
+            <a:noFill/>
+          </a:ln>
+        </p:spPr>
+        <p:txBody>
+          <a:bodyPr lIns="0" rIns="0"/>
+          <a:lstStyle/>
+          <a:p>
+            <a:pPr marL="384120" lvl="1" indent="-182520">
+              <a:lnSpc>
+                <a:spcPct val="100000"/>
+              </a:lnSpc>
+              <a:buClr>
+                <a:srgbClr val="9DBFBE"/>
+              </a:buClr>
+              <a:buFont typeface="Calibri"/>
+              <a:buChar char="◦"/>
+            </a:pPr>
+            <a:r>
+              <a:rPr lang="en-US" sz="2400" b="0" strike="noStrike" spc="-1" dirty="0">
+                <a:solidFill>
+                  <a:srgbClr val="404040"/>
+                </a:solidFill>
+                <a:uFill>
+                  <a:solidFill>
+                    <a:srgbClr val="FFFFFF"/>
+                  </a:solidFill>
+                </a:uFill>
+                <a:latin typeface="Calibri"/>
+              </a:rPr>
+              <a:t>Tracks relevant data from different NDRRMC </a:t>
+            </a:r>
+            <a:r>
+              <a:rPr lang="en-US" sz="2400" spc="-1" dirty="0">
+                <a:solidFill>
+                  <a:srgbClr val="404040"/>
+                </a:solidFill>
+                <a:uFill>
+                  <a:solidFill>
+                    <a:srgbClr val="FFFFFF"/>
+                  </a:solidFill>
+                </a:uFill>
+                <a:latin typeface="Calibri"/>
+              </a:rPr>
+              <a:t>stand-alone</a:t>
+            </a:r>
+            <a:r>
+              <a:rPr lang="en-US" sz="2400" b="0" strike="noStrike" spc="-1" dirty="0">
+                <a:solidFill>
+                  <a:srgbClr val="404040"/>
+                </a:solidFill>
+                <a:uFill>
+                  <a:solidFill>
+                    <a:srgbClr val="FFFFFF"/>
+                  </a:solidFill>
+                </a:uFill>
+                <a:latin typeface="Calibri"/>
+              </a:rPr>
+              <a:t> systems (e.g. Logistics, Inventory, Procurement, etc.) </a:t>
+            </a:r>
+            <a:endParaRPr lang="en-US" sz="1400" b="0" strike="noStrike" spc="-1" dirty="0">
+              <a:solidFill>
+                <a:srgbClr val="404040"/>
+              </a:solidFill>
+              <a:uFill>
+                <a:solidFill>
+                  <a:srgbClr val="FFFFFF"/>
+                </a:solidFill>
+              </a:uFill>
+              <a:latin typeface="Calibri"/>
+            </a:endParaRPr>
+          </a:p>
+          <a:p>
+            <a:endParaRPr lang="en-US" sz="2000" b="0" strike="noStrike" spc="-1" dirty="0">
+              <a:solidFill>
+                <a:srgbClr val="404040"/>
+              </a:solidFill>
+              <a:uFill>
+                <a:solidFill>
+                  <a:srgbClr val="FFFFFF"/>
+                </a:solidFill>
+              </a:uFill>
+              <a:latin typeface="Calibri"/>
+            </a:endParaRPr>
+          </a:p>
+          <a:p>
+            <a:pPr marL="384120" lvl="1" indent="-182520">
+              <a:lnSpc>
+                <a:spcPct val="100000"/>
+              </a:lnSpc>
+              <a:buClr>
+                <a:srgbClr val="9DBFBE"/>
+              </a:buClr>
+              <a:buFont typeface="Calibri"/>
+              <a:buChar char="◦"/>
+            </a:pPr>
+            <a:r>
+              <a:rPr lang="en-US" sz="2400" b="0" strike="noStrike" spc="-1" dirty="0">
+                <a:solidFill>
+                  <a:srgbClr val="404040"/>
+                </a:solidFill>
+                <a:uFill>
+                  <a:solidFill>
+                    <a:srgbClr val="FFFFFF"/>
+                  </a:solidFill>
+                </a:uFill>
+                <a:latin typeface="Calibri"/>
+              </a:rPr>
+              <a:t>Law and Order </a:t>
+            </a:r>
+            <a:r>
+              <a:rPr lang="en-US" sz="2400" spc="-1" dirty="0">
+                <a:solidFill>
+                  <a:srgbClr val="404040"/>
+                </a:solidFill>
+                <a:uFill>
+                  <a:solidFill>
+                    <a:srgbClr val="FFFFFF"/>
+                  </a:solidFill>
+                </a:uFill>
+                <a:latin typeface="Calibri"/>
+              </a:rPr>
+              <a:t>sends report</a:t>
+            </a:r>
+            <a:endParaRPr lang="en-US" sz="1400" b="0" strike="noStrike" spc="-1" dirty="0">
+              <a:solidFill>
+                <a:srgbClr val="404040"/>
+              </a:solidFill>
+              <a:uFill>
+                <a:solidFill>
+                  <a:srgbClr val="FFFFFF"/>
+                </a:solidFill>
+              </a:uFill>
+              <a:latin typeface="Calibri"/>
+            </a:endParaRPr>
+          </a:p>
+          <a:p>
+            <a:endParaRPr lang="en-US" sz="2000" b="0" strike="noStrike" spc="-1" dirty="0">
+              <a:solidFill>
+                <a:srgbClr val="404040"/>
+              </a:solidFill>
+              <a:uFill>
+                <a:solidFill>
+                  <a:srgbClr val="FFFFFF"/>
+                </a:solidFill>
+              </a:uFill>
+              <a:latin typeface="Calibri"/>
+            </a:endParaRPr>
+          </a:p>
+          <a:p>
+            <a:pPr marL="384120" lvl="1" indent="-182520">
+              <a:lnSpc>
+                <a:spcPct val="100000"/>
+              </a:lnSpc>
+              <a:buClr>
+                <a:srgbClr val="9DBFBE"/>
+              </a:buClr>
+              <a:buFont typeface="Calibri"/>
+              <a:buChar char="◦"/>
+            </a:pPr>
+            <a:r>
+              <a:rPr lang="en-US" sz="2400" b="0" strike="noStrike" spc="-1" dirty="0">
+                <a:solidFill>
+                  <a:srgbClr val="404040"/>
+                </a:solidFill>
+                <a:uFill>
+                  <a:solidFill>
+                    <a:srgbClr val="FFFFFF"/>
+                  </a:solidFill>
+                </a:uFill>
+                <a:latin typeface="Calibri"/>
+              </a:rPr>
+              <a:t>Users receive a notification about the report details</a:t>
+            </a:r>
+            <a:endParaRPr lang="en-US" sz="1400" b="0" strike="noStrike" spc="-1" dirty="0">
+              <a:solidFill>
+                <a:srgbClr val="404040"/>
+              </a:solidFill>
+              <a:uFill>
+                <a:solidFill>
+                  <a:srgbClr val="FFFFFF"/>
+                </a:solidFill>
+              </a:uFill>
+              <a:latin typeface="Calibri"/>
+            </a:endParaRPr>
+          </a:p>
+          <a:p>
+            <a:pPr>
+              <a:lnSpc>
+                <a:spcPct val="90000"/>
+              </a:lnSpc>
+            </a:pPr>
+            <a:endParaRPr lang="en-US" sz="2000" b="0" strike="noStrike" spc="-1" dirty="0">
+              <a:solidFill>
+                <a:srgbClr val="404040"/>
+              </a:solidFill>
+              <a:uFill>
+                <a:solidFill>
+                  <a:srgbClr val="FFFFFF"/>
+                </a:solidFill>
+              </a:uFill>
+              <a:latin typeface="Calibri"/>
+            </a:endParaRPr>
+          </a:p>
+        </p:txBody>
+      </p:sp>
     </p:spTree>
-    <p:extLst>
-      <p:ext uri="{BB962C8B-B14F-4D97-AF65-F5344CB8AC3E}">
-        <p14:creationId xmlns:p14="http://schemas.microsoft.com/office/powerpoint/2010/main" val="3890904918"/>
-      </p:ext>
-    </p:extLst>
   </p:cSld>
   <p:clrMapOvr>
     <a:masterClrMapping/>
@@ -6221,7 +7176,7 @@
               </a:lnSpc>
             </a:pPr>
             <a:r>
-              <a:rPr lang="en-US" sz="4800" b="1" strike="noStrike" spc="-49">
+              <a:rPr lang="en-US" sz="4800" b="1" strike="noStrike" spc="-49" dirty="0">
                 <a:solidFill>
                   <a:srgbClr val="404040"/>
                 </a:solidFill>
@@ -6232,9 +7187,9 @@
                 </a:uFill>
                 <a:latin typeface="Calibri Light"/>
               </a:rPr>
-              <a:t>Scope</a:t>
+              <a:t>Target User</a:t>
             </a:r>
-            <a:endParaRPr lang="en-US" sz="1800" b="0" strike="noStrike" spc="-1">
+            <a:endParaRPr lang="en-US" sz="1800" b="0" strike="noStrike" spc="-1" dirty="0">
               <a:solidFill>
                 <a:srgbClr val="000000"/>
               </a:solidFill>
@@ -6248,223 +7203,41 @@
           </a:p>
         </p:txBody>
       </p:sp>
-      <p:sp>
-        <p:nvSpPr>
-          <p:cNvPr id="96" name="TextShape 2"/>
-          <p:cNvSpPr txBox="1"/>
+      <p:pic>
+        <p:nvPicPr>
+          <p:cNvPr id="2" name="Picture 1"/>
+          <p:cNvPicPr>
+            <a:picLocks noChangeAspect="1"/>
+          </p:cNvPicPr>
           <p:nvPr/>
-        </p:nvSpPr>
-        <p:spPr>
-          <a:xfrm>
-            <a:off x="1097280" y="1845720"/>
-            <a:ext cx="10058040" cy="4023000"/>
-          </a:xfrm>
-          <a:prstGeom prst="rect">
-            <a:avLst/>
-          </a:prstGeom>
-          <a:noFill/>
-          <a:ln>
-            <a:noFill/>
-          </a:ln>
-        </p:spPr>
-        <p:txBody>
-          <a:bodyPr lIns="0" rIns="0"/>
-          <a:lstStyle/>
-          <a:p>
-            <a:pPr marL="91440" indent="-91080">
-              <a:lnSpc>
-                <a:spcPct val="100000"/>
-              </a:lnSpc>
-              <a:buClr>
-                <a:srgbClr val="9DBFBE"/>
-              </a:buClr>
-              <a:buFont typeface="Calibri"/>
-              <a:buChar char=" "/>
-            </a:pPr>
-            <a:r>
-              <a:rPr lang="en-US" sz="2400" b="0" strike="noStrike" spc="-1">
-                <a:solidFill>
-                  <a:srgbClr val="404040"/>
-                </a:solidFill>
-                <a:uFill>
-                  <a:solidFill>
-                    <a:srgbClr val="FFFFFF"/>
-                  </a:solidFill>
-                </a:uFill>
-                <a:latin typeface="Calibri"/>
-              </a:rPr>
-              <a:t>The coverage of NDRRMC Monitoring System is the following:</a:t>
-            </a:r>
-            <a:endParaRPr lang="en-US" sz="2000" b="0" strike="noStrike" spc="-1">
-              <a:solidFill>
-                <a:srgbClr val="404040"/>
-              </a:solidFill>
-              <a:uFill>
-                <a:solidFill>
-                  <a:srgbClr val="FFFFFF"/>
-                </a:solidFill>
-              </a:uFill>
-              <a:latin typeface="Calibri"/>
-            </a:endParaRPr>
-          </a:p>
-          <a:p>
-            <a:pPr marL="384120" lvl="1" indent="-182520">
-              <a:lnSpc>
-                <a:spcPct val="100000"/>
-              </a:lnSpc>
-              <a:buClr>
-                <a:srgbClr val="9DBFBE"/>
-              </a:buClr>
-              <a:buFont typeface="Calibri"/>
-              <a:buChar char="◦"/>
-            </a:pPr>
-            <a:r>
-              <a:rPr lang="en-US" sz="2400" b="0" strike="noStrike" spc="-1">
-                <a:solidFill>
-                  <a:srgbClr val="404040"/>
-                </a:solidFill>
-                <a:uFill>
-                  <a:solidFill>
-                    <a:srgbClr val="FFFFFF"/>
-                  </a:solidFill>
-                </a:uFill>
-                <a:latin typeface="Calibri"/>
-              </a:rPr>
-              <a:t>NDRRMC Monitoring System collects the data from different resources or system</a:t>
-            </a:r>
-            <a:endParaRPr lang="en-US" sz="1400" b="0" strike="noStrike" spc="-1">
-              <a:solidFill>
-                <a:srgbClr val="404040"/>
-              </a:solidFill>
-              <a:uFill>
-                <a:solidFill>
-                  <a:srgbClr val="FFFFFF"/>
-                </a:solidFill>
-              </a:uFill>
-              <a:latin typeface="Calibri"/>
-            </a:endParaRPr>
-          </a:p>
-          <a:p>
-            <a:endParaRPr lang="en-US" sz="2000" b="0" strike="noStrike" spc="-1">
-              <a:solidFill>
-                <a:srgbClr val="404040"/>
-              </a:solidFill>
-              <a:uFill>
-                <a:solidFill>
-                  <a:srgbClr val="FFFFFF"/>
-                </a:solidFill>
-              </a:uFill>
-              <a:latin typeface="Calibri"/>
-            </a:endParaRPr>
-          </a:p>
-          <a:p>
-            <a:pPr marL="384120" lvl="1" indent="-182520">
-              <a:lnSpc>
-                <a:spcPct val="100000"/>
-              </a:lnSpc>
-              <a:buClr>
-                <a:srgbClr val="9DBFBE"/>
-              </a:buClr>
-              <a:buFont typeface="Calibri"/>
-              <a:buChar char="◦"/>
-            </a:pPr>
-            <a:r>
-              <a:rPr lang="en-US" sz="2400" b="0" strike="noStrike" spc="-1">
-                <a:solidFill>
-                  <a:srgbClr val="404040"/>
-                </a:solidFill>
-                <a:uFill>
-                  <a:solidFill>
-                    <a:srgbClr val="FFFFFF"/>
-                  </a:solidFill>
-                </a:uFill>
-                <a:latin typeface="Calibri"/>
-              </a:rPr>
-              <a:t>NDRRMC Monitoring System data gathered from Law and Order Report will be send to responsible user/s as notification</a:t>
-            </a:r>
-            <a:endParaRPr lang="en-US" sz="1400" b="0" strike="noStrike" spc="-1">
-              <a:solidFill>
-                <a:srgbClr val="404040"/>
-              </a:solidFill>
-              <a:uFill>
-                <a:solidFill>
-                  <a:srgbClr val="FFFFFF"/>
-                </a:solidFill>
-              </a:uFill>
-              <a:latin typeface="Calibri"/>
-            </a:endParaRPr>
-          </a:p>
-          <a:p>
-            <a:endParaRPr lang="en-US" sz="2000" b="0" strike="noStrike" spc="-1">
-              <a:solidFill>
-                <a:srgbClr val="404040"/>
-              </a:solidFill>
-              <a:uFill>
-                <a:solidFill>
-                  <a:srgbClr val="FFFFFF"/>
-                </a:solidFill>
-              </a:uFill>
-              <a:latin typeface="Calibri"/>
-            </a:endParaRPr>
-          </a:p>
-          <a:p>
-            <a:pPr marL="384120" lvl="1" indent="-182520">
-              <a:lnSpc>
-                <a:spcPct val="100000"/>
-              </a:lnSpc>
-              <a:buClr>
-                <a:srgbClr val="9DBFBE"/>
-              </a:buClr>
-              <a:buFont typeface="Calibri"/>
-              <a:buChar char="◦"/>
-            </a:pPr>
-            <a:r>
-              <a:rPr lang="en-US" sz="2400" b="0" strike="noStrike" spc="-1">
-                <a:solidFill>
-                  <a:srgbClr val="404040"/>
-                </a:solidFill>
-                <a:uFill>
-                  <a:solidFill>
-                    <a:srgbClr val="FFFFFF"/>
-                  </a:solidFill>
-                </a:uFill>
-                <a:latin typeface="Calibri"/>
-              </a:rPr>
-              <a:t>NDRMMC Monitoring System provides summary reports in form of dashboards using analytic tool</a:t>
-            </a:r>
-            <a:endParaRPr lang="en-US" sz="1400" b="0" strike="noStrike" spc="-1">
-              <a:solidFill>
-                <a:srgbClr val="404040"/>
-              </a:solidFill>
-              <a:uFill>
-                <a:solidFill>
-                  <a:srgbClr val="FFFFFF"/>
-                </a:solidFill>
-              </a:uFill>
-              <a:latin typeface="Calibri"/>
-            </a:endParaRPr>
-          </a:p>
-          <a:p>
-            <a:pPr>
-              <a:lnSpc>
-                <a:spcPct val="90000"/>
-              </a:lnSpc>
-            </a:pPr>
-            <a:endParaRPr lang="en-US" sz="2000" b="0" strike="noStrike" spc="-1">
-              <a:solidFill>
-                <a:srgbClr val="404040"/>
-              </a:solidFill>
-              <a:uFill>
-                <a:solidFill>
-                  <a:srgbClr val="FFFFFF"/>
-                </a:solidFill>
-              </a:uFill>
-              <a:latin typeface="Calibri"/>
-            </a:endParaRPr>
-          </a:p>
-        </p:txBody>
-      </p:sp>
+        </p:nvPicPr>
+        <p:blipFill rotWithShape="1">
+          <a:blip r:embed="rId2">
+            <a:extLst>
+              <a:ext uri="{28A0092B-C50C-407E-A947-70E740481C1C}">
+                <a14:useLocalDpi xmlns:a14="http://schemas.microsoft.com/office/drawing/2010/main" val="0"/>
+              </a:ext>
+            </a:extLst>
+          </a:blip>
+          <a:srcRect l="18932"/>
+          <a:stretch/>
+        </p:blipFill>
+        <p:spPr>
+          <a:xfrm>
+            <a:off x="1816101" y="1902541"/>
+            <a:ext cx="8136968" cy="4284325"/>
+          </a:xfrm>
+          <a:prstGeom prst="rect">
+            <a:avLst/>
+          </a:prstGeom>
+        </p:spPr>
+      </p:pic>
     </p:spTree>
+    <p:extLst>
+      <p:ext uri="{BB962C8B-B14F-4D97-AF65-F5344CB8AC3E}">
+        <p14:creationId xmlns:p14="http://schemas.microsoft.com/office/powerpoint/2010/main" val="3890904918"/>
+      </p:ext>
+    </p:extLst>
   </p:cSld>
   <p:clrMapOvr>
     <a:masterClrMapping/>
@@ -6526,7 +7299,7 @@
       </p:grpSpPr>
       <p:sp>
         <p:nvSpPr>
-          <p:cNvPr id="97" name="TextShape 1"/>
+          <p:cNvPr id="95" name="TextShape 1"/>
           <p:cNvSpPr txBox="1"/>
           <p:nvPr/>
         </p:nvSpPr>
@@ -6564,7 +7337,7 @@
                 </a:uFill>
                 <a:latin typeface="Calibri Light"/>
               </a:rPr>
-              <a:t>Limitations</a:t>
+              <a:t>Scope</a:t>
             </a:r>
             <a:endParaRPr lang="en-US" sz="1800" b="0" strike="noStrike" spc="-1">
               <a:solidFill>
@@ -6582,7 +7355,7 @@
       </p:sp>
       <p:sp>
         <p:nvSpPr>
-          <p:cNvPr id="98" name="TextShape 2"/>
+          <p:cNvPr id="96" name="TextShape 2"/>
           <p:cNvSpPr txBox="1"/>
           <p:nvPr/>
         </p:nvSpPr>
@@ -6602,6 +7375,43 @@
         <p:txBody>
           <a:bodyPr lIns="0" rIns="0"/>
           <a:lstStyle/>
+          <a:p>
+            <a:pPr marL="91440" indent="-91080">
+              <a:lnSpc>
+                <a:spcPct val="100000"/>
+              </a:lnSpc>
+              <a:buClr>
+                <a:srgbClr val="9DBFBE"/>
+              </a:buClr>
+              <a:buFont typeface="Calibri"/>
+              <a:buChar char=" "/>
+            </a:pPr>
+            <a:r>
+              <a:rPr lang="en-US" sz="2400" b="0" strike="noStrike" spc="-1">
+                <a:solidFill>
+                  <a:srgbClr val="404040"/>
+                </a:solidFill>
+                <a:uFill>
+                  <a:solidFill>
+                    <a:srgbClr val="FFFFFF"/>
+                  </a:solidFill>
+                </a:uFill>
+                <a:latin typeface="Calibri"/>
+              </a:rPr>
+              <a:t>The coverage of NDRRMC Monitoring System is the following:</a:t>
+            </a:r>
+            <a:endParaRPr lang="en-US" sz="2000" b="0" strike="noStrike" spc="-1">
+              <a:solidFill>
+                <a:srgbClr val="404040"/>
+              </a:solidFill>
+              <a:uFill>
+                <a:solidFill>
+                  <a:srgbClr val="FFFFFF"/>
+                </a:solidFill>
+              </a:uFill>
+              <a:latin typeface="Calibri"/>
+            </a:endParaRPr>
+          </a:p>
           <a:p>
             <a:pPr marL="384120" lvl="1" indent="-182520">
               <a:lnSpc>
@@ -6625,7 +7435,7 @@
                 </a:uFill>
                 <a:latin typeface="Calibri"/>
               </a:rPr>
-              <a:t>Account for LGUs, NDRRMC member agencies, admins of different NDRRMC system</a:t>
+              <a:t>NDRRMC Monitoring System collects the data from different resources or system</a:t>
             </a:r>
             <a:endParaRPr lang="en-US" sz="1400" b="0" strike="noStrike" spc="-1">
               <a:solidFill>
@@ -6675,7 +7485,7 @@
                 </a:uFill>
                 <a:latin typeface="Calibri"/>
               </a:rPr>
-              <a:t>Produce summary reports of the data of each of the system</a:t>
+              <a:t>NDRRMC Monitoring System data gathered from Law and Order Report will be send to responsible user/s as notification</a:t>
             </a:r>
             <a:endParaRPr lang="en-US" sz="1400" b="0" strike="noStrike" spc="-1">
               <a:solidFill>
@@ -6725,9 +7535,27 @@
                 </a:uFill>
                 <a:latin typeface="Calibri"/>
               </a:rPr>
-              <a:t>Report details that is being notified to users heavily depends on Law and Order System</a:t>
+              <a:t>NDRMMC Monitoring System provides summary reports in form of dashboards using analytic tool</a:t>
             </a:r>
             <a:endParaRPr lang="en-US" sz="1400" b="0" strike="noStrike" spc="-1">
+              <a:solidFill>
+                <a:srgbClr val="404040"/>
+              </a:solidFill>
+              <a:uFill>
+                <a:solidFill>
+                  <a:srgbClr val="FFFFFF"/>
+                </a:solidFill>
+              </a:uFill>
+              <a:latin typeface="Calibri"/>
+            </a:endParaRPr>
+          </a:p>
+          <a:p>
+            <a:pPr>
+              <a:lnSpc>
+                <a:spcPct val="90000"/>
+              </a:lnSpc>
+            </a:pPr>
+            <a:endParaRPr lang="en-US" sz="2000" b="0" strike="noStrike" spc="-1">
               <a:solidFill>
                 <a:srgbClr val="404040"/>
               </a:solidFill>
@@ -6803,7 +7631,7 @@
       </p:grpSpPr>
       <p:sp>
         <p:nvSpPr>
-          <p:cNvPr id="99" name="TextShape 1"/>
+          <p:cNvPr id="97" name="TextShape 1"/>
           <p:cNvSpPr txBox="1"/>
           <p:nvPr/>
         </p:nvSpPr>
@@ -6841,7 +7669,7 @@
                 </a:uFill>
                 <a:latin typeface="Calibri Light"/>
               </a:rPr>
-              <a:t>Review of Related Literature/System</a:t>
+              <a:t>Limitations</a:t>
             </a:r>
             <a:endParaRPr lang="en-US" sz="1800" b="0" strike="noStrike" spc="-1">
               <a:solidFill>
@@ -6859,7 +7687,7 @@
       </p:sp>
       <p:sp>
         <p:nvSpPr>
-          <p:cNvPr id="100" name="TextShape 2"/>
+          <p:cNvPr id="98" name="TextShape 2"/>
           <p:cNvSpPr txBox="1"/>
           <p:nvPr/>
         </p:nvSpPr>
@@ -6891,7 +7719,7 @@
               <a:buChar char="◦"/>
             </a:pPr>
             <a:r>
-              <a:rPr lang="en-US" sz="2400" b="0" strike="noStrike" spc="-1">
+              <a:rPr lang="en-US" sz="2400" b="0" strike="noStrike" spc="-1" dirty="0">
                 <a:solidFill>
                   <a:srgbClr val="404040"/>
                 </a:solidFill>
@@ -6902,9 +7730,9 @@
                 </a:uFill>
                 <a:latin typeface="Calibri"/>
               </a:rPr>
-              <a:t>Sahana Eden (Emergency Development ENvironment) </a:t>
+              <a:t>Account for LGUs, NDRRMC member agencies, admins of different NDRRMC system</a:t>
             </a:r>
-            <a:endParaRPr lang="en-US" sz="1400" b="0" strike="noStrike" spc="-1">
+            <a:endParaRPr lang="en-US" sz="1400" b="0" strike="noStrike" spc="-1" dirty="0">
               <a:solidFill>
                 <a:srgbClr val="404040"/>
               </a:solidFill>
@@ -6917,7 +7745,7 @@
             </a:endParaRPr>
           </a:p>
           <a:p>
-            <a:endParaRPr lang="en-US" sz="2000" b="0" strike="noStrike" spc="-1">
+            <a:endParaRPr lang="en-US" sz="2000" b="0" strike="noStrike" spc="-1" dirty="0">
               <a:solidFill>
                 <a:srgbClr val="404040"/>
               </a:solidFill>
@@ -6941,7 +7769,7 @@
               <a:buChar char="◦"/>
             </a:pPr>
             <a:r>
-              <a:rPr lang="en-US" sz="2400" b="0" strike="noStrike" spc="-1">
+              <a:rPr lang="en-US" sz="2400" b="0" strike="noStrike" spc="-1" dirty="0">
                 <a:solidFill>
                   <a:srgbClr val="404040"/>
                 </a:solidFill>
@@ -6952,9 +7780,9 @@
                 </a:uFill>
                 <a:latin typeface="Calibri"/>
               </a:rPr>
-              <a:t>Pentaho Analysis Tool</a:t>
+              <a:t>Produce summary reports of the data of each of the system</a:t>
             </a:r>
-            <a:endParaRPr lang="en-US" sz="1400" b="0" strike="noStrike" spc="-1">
+            <a:endParaRPr lang="en-US" sz="1400" b="0" strike="noStrike" spc="-1" dirty="0">
               <a:solidFill>
                 <a:srgbClr val="404040"/>
               </a:solidFill>
@@ -6967,7 +7795,7 @@
             </a:endParaRPr>
           </a:p>
           <a:p>
-            <a:endParaRPr lang="en-US" sz="2000" b="0" strike="noStrike" spc="-1">
+            <a:endParaRPr lang="en-US" sz="2000" b="0" strike="noStrike" spc="-1" dirty="0">
               <a:solidFill>
                 <a:srgbClr val="404040"/>
               </a:solidFill>
@@ -6991,7 +7819,7 @@
               <a:buChar char="◦"/>
             </a:pPr>
             <a:r>
-              <a:rPr lang="en-US" sz="2400" b="0" strike="noStrike" spc="-1">
+              <a:rPr lang="en-US" sz="2400" b="0" strike="noStrike" spc="-1" dirty="0">
                 <a:solidFill>
                   <a:srgbClr val="404040"/>
                 </a:solidFill>
@@ -7002,22 +7830,9 @@
                 </a:uFill>
                 <a:latin typeface="Calibri"/>
               </a:rPr>
-              <a:t>Karnataka State Natural Disaster Monitoring Centre (KSNDMC) GIS System</a:t>
+              <a:t>Report details heavily depends on Law and Order System</a:t>
             </a:r>
-            <a:endParaRPr lang="en-US" sz="1400" b="0" strike="noStrike" spc="-1">
-              <a:solidFill>
-                <a:srgbClr val="404040"/>
-              </a:solidFill>
-              <a:uFill>
-                <a:solidFill>
-                  <a:srgbClr val="FFFFFF"/>
-                </a:solidFill>
-              </a:uFill>
-              <a:latin typeface="Calibri"/>
-            </a:endParaRPr>
-          </a:p>
-          <a:p>
-            <a:endParaRPr lang="en-US" sz="2000" b="0" strike="noStrike" spc="-1">
+            <a:endParaRPr lang="en-US" sz="1400" b="0" strike="noStrike" spc="-1" dirty="0">
               <a:solidFill>
                 <a:srgbClr val="404040"/>
               </a:solidFill>

</xml_diff>